<commit_message>
atualizei o powerpoint para ser mais claro e simplificado
</commit_message>
<xml_diff>
--- a/P.I/A HISTÓRIA DO 2-TONE SKA.pptx
+++ b/P.I/A HISTÓRIA DO 2-TONE SKA.pptx
@@ -5,17 +5,22 @@
     <p:sldMasterId id="2147483660" r:id="rId4"/>
   </p:sldMasterIdLst>
   <p:notesMasterIdLst>
-    <p:notesMasterId r:id="rId10"/>
+    <p:notesMasterId r:id="rId15"/>
   </p:notesMasterIdLst>
   <p:handoutMasterIdLst>
-    <p:handoutMasterId r:id="rId11"/>
+    <p:handoutMasterId r:id="rId16"/>
   </p:handoutMasterIdLst>
   <p:sldIdLst>
     <p:sldId id="310" r:id="rId5"/>
-    <p:sldId id="311" r:id="rId6"/>
-    <p:sldId id="312" r:id="rId7"/>
-    <p:sldId id="313" r:id="rId8"/>
-    <p:sldId id="314" r:id="rId9"/>
+    <p:sldId id="315" r:id="rId6"/>
+    <p:sldId id="311" r:id="rId7"/>
+    <p:sldId id="312" r:id="rId8"/>
+    <p:sldId id="313" r:id="rId9"/>
+    <p:sldId id="314" r:id="rId10"/>
+    <p:sldId id="316" r:id="rId11"/>
+    <p:sldId id="317" r:id="rId12"/>
+    <p:sldId id="318" r:id="rId13"/>
+    <p:sldId id="319" r:id="rId14"/>
   </p:sldIdLst>
   <p:sldSz cx="12192000" cy="6858000"/>
   <p:notesSz cx="6858000" cy="9144000"/>
@@ -128,7 +133,7 @@
 <file path=ppt/revisionInfo.xml><?xml version="1.0" encoding="utf-8"?>
 <p1510:revInfo xmlns:a="http://schemas.openxmlformats.org/drawingml/2006/main" xmlns:r="http://schemas.openxmlformats.org/officeDocument/2006/relationships" xmlns:p1510="http://schemas.microsoft.com/office/powerpoint/2015/10/main">
   <p1510:revLst>
-    <p1510:client id="{8E898EB5-4A95-4865-8D96-AF816AE5B8C3}" v="85" dt="2022-11-05T23:43:04.504"/>
+    <p1510:client id="{8E898EB5-4A95-4865-8D96-AF816AE5B8C3}" v="392" dt="2022-11-07T22:54:41.998"/>
   </p1510:revLst>
 </p1510:revInfo>
 </file>
@@ -137,26 +142,74 @@
 <pc:chgInfo xmlns:a="http://schemas.openxmlformats.org/drawingml/2006/main" xmlns:r="http://schemas.openxmlformats.org/officeDocument/2006/relationships" xmlns:ac="http://schemas.microsoft.com/office/drawing/2013/main/command" xmlns:pc="http://schemas.microsoft.com/office/powerpoint/2013/main/command">
   <pc:docChgLst>
     <pc:chgData name="william kokubun" userId="d4688b2ef84ae56b" providerId="LiveId" clId="{8E898EB5-4A95-4865-8D96-AF816AE5B8C3}"/>
-    <pc:docChg chg="custSel addSld delSld modSld sldOrd">
-      <pc:chgData name="william kokubun" userId="d4688b2ef84ae56b" providerId="LiveId" clId="{8E898EB5-4A95-4865-8D96-AF816AE5B8C3}" dt="2022-11-05T23:43:48.756" v="644" actId="1076"/>
+    <pc:docChg chg="undo custSel addSld delSld modSld sldOrd">
+      <pc:chgData name="william kokubun" userId="d4688b2ef84ae56b" providerId="LiveId" clId="{8E898EB5-4A95-4865-8D96-AF816AE5B8C3}" dt="2022-11-07T22:54:41.998" v="1250"/>
       <pc:docMkLst>
         <pc:docMk/>
       </pc:docMkLst>
-      <pc:sldChg chg="modAnim">
-        <pc:chgData name="william kokubun" userId="d4688b2ef84ae56b" providerId="LiveId" clId="{8E898EB5-4A95-4865-8D96-AF816AE5B8C3}" dt="2022-11-05T23:31:31.479" v="565"/>
+      <pc:sldChg chg="addSp delSp modSp mod delAnim modAnim">
+        <pc:chgData name="william kokubun" userId="d4688b2ef84ae56b" providerId="LiveId" clId="{8E898EB5-4A95-4865-8D96-AF816AE5B8C3}" dt="2022-11-07T22:50:22.330" v="1234"/>
         <pc:sldMkLst>
           <pc:docMk/>
           <pc:sldMk cId="63937294" sldId="310"/>
         </pc:sldMkLst>
+        <pc:spChg chg="mod">
+          <ac:chgData name="william kokubun" userId="d4688b2ef84ae56b" providerId="LiveId" clId="{8E898EB5-4A95-4865-8D96-AF816AE5B8C3}" dt="2022-11-07T22:27:59.048" v="671" actId="1076"/>
+          <ac:spMkLst>
+            <pc:docMk/>
+            <pc:sldMk cId="63937294" sldId="310"/>
+            <ac:spMk id="2" creationId="{26D8BE54-5D43-E7D0-949C-0486BBEF2B3C}"/>
+          </ac:spMkLst>
+        </pc:spChg>
+        <pc:spChg chg="add mod">
+          <ac:chgData name="william kokubun" userId="d4688b2ef84ae56b" providerId="LiveId" clId="{8E898EB5-4A95-4865-8D96-AF816AE5B8C3}" dt="2022-11-07T22:32:08.134" v="730" actId="1076"/>
+          <ac:spMkLst>
+            <pc:docMk/>
+            <pc:sldMk cId="63937294" sldId="310"/>
+            <ac:spMk id="3" creationId="{A24ECBE8-7B6A-8DEE-4C4C-38FE24DD6365}"/>
+          </ac:spMkLst>
+        </pc:spChg>
+        <pc:spChg chg="add mod">
+          <ac:chgData name="william kokubun" userId="d4688b2ef84ae56b" providerId="LiveId" clId="{8E898EB5-4A95-4865-8D96-AF816AE5B8C3}" dt="2022-11-07T22:32:17.321" v="732" actId="1076"/>
+          <ac:spMkLst>
+            <pc:docMk/>
+            <pc:sldMk cId="63937294" sldId="310"/>
+            <ac:spMk id="4" creationId="{01F8A72D-AF4A-F551-181E-6AEF79963A87}"/>
+          </ac:spMkLst>
+        </pc:spChg>
+        <pc:picChg chg="del mod">
+          <ac:chgData name="william kokubun" userId="d4688b2ef84ae56b" providerId="LiveId" clId="{8E898EB5-4A95-4865-8D96-AF816AE5B8C3}" dt="2022-11-07T22:27:46.587" v="652" actId="478"/>
+          <ac:picMkLst>
+            <pc:docMk/>
+            <pc:sldMk cId="63937294" sldId="310"/>
+            <ac:picMk id="7" creationId="{AB1FAA1B-13CA-A139-D560-7CD57291327D}"/>
+          </ac:picMkLst>
+        </pc:picChg>
+        <pc:picChg chg="add mod">
+          <ac:chgData name="william kokubun" userId="d4688b2ef84ae56b" providerId="LiveId" clId="{8E898EB5-4A95-4865-8D96-AF816AE5B8C3}" dt="2022-11-07T22:31:57.697" v="728" actId="1076"/>
+          <ac:picMkLst>
+            <pc:docMk/>
+            <pc:sldMk cId="63937294" sldId="310"/>
+            <ac:picMk id="8" creationId="{FD586C59-F7DE-C32D-F634-D1E5FCE8634F}"/>
+          </ac:picMkLst>
+        </pc:picChg>
       </pc:sldChg>
-      <pc:sldChg chg="modSp mod modAnim">
-        <pc:chgData name="william kokubun" userId="d4688b2ef84ae56b" providerId="LiveId" clId="{8E898EB5-4A95-4865-8D96-AF816AE5B8C3}" dt="2022-11-05T23:37:26.120" v="598" actId="20577"/>
+      <pc:sldChg chg="addSp modSp mod modTransition modAnim">
+        <pc:chgData name="william kokubun" userId="d4688b2ef84ae56b" providerId="LiveId" clId="{8E898EB5-4A95-4865-8D96-AF816AE5B8C3}" dt="2022-11-07T22:53:45.491" v="1242"/>
         <pc:sldMkLst>
           <pc:docMk/>
           <pc:sldMk cId="1986591939" sldId="311"/>
         </pc:sldMkLst>
+        <pc:spChg chg="add mod">
+          <ac:chgData name="william kokubun" userId="d4688b2ef84ae56b" providerId="LiveId" clId="{8E898EB5-4A95-4865-8D96-AF816AE5B8C3}" dt="2022-11-07T22:34:27.936" v="829" actId="1076"/>
+          <ac:spMkLst>
+            <pc:docMk/>
+            <pc:sldMk cId="1986591939" sldId="311"/>
+            <ac:spMk id="2" creationId="{87A2E33D-F8E3-A5BF-DD5C-214042BF7732}"/>
+          </ac:spMkLst>
+        </pc:spChg>
         <pc:spChg chg="mod">
-          <ac:chgData name="william kokubun" userId="d4688b2ef84ae56b" providerId="LiveId" clId="{8E898EB5-4A95-4865-8D96-AF816AE5B8C3}" dt="2022-11-05T23:37:26.120" v="598" actId="20577"/>
+          <ac:chgData name="william kokubun" userId="d4688b2ef84ae56b" providerId="LiveId" clId="{8E898EB5-4A95-4865-8D96-AF816AE5B8C3}" dt="2022-11-07T22:33:51.111" v="820" actId="1076"/>
           <ac:spMkLst>
             <pc:docMk/>
             <pc:sldMk cId="1986591939" sldId="311"/>
@@ -164,7 +217,7 @@
           </ac:spMkLst>
         </pc:spChg>
         <pc:picChg chg="mod">
-          <ac:chgData name="william kokubun" userId="d4688b2ef84ae56b" providerId="LiveId" clId="{8E898EB5-4A95-4865-8D96-AF816AE5B8C3}" dt="2022-11-05T23:05:07.076" v="502" actId="1076"/>
+          <ac:chgData name="william kokubun" userId="d4688b2ef84ae56b" providerId="LiveId" clId="{8E898EB5-4A95-4865-8D96-AF816AE5B8C3}" dt="2022-11-07T22:34:31.999" v="830" actId="1076"/>
           <ac:picMkLst>
             <pc:docMk/>
             <pc:sldMk cId="1986591939" sldId="311"/>
@@ -172,8 +225,8 @@
           </ac:picMkLst>
         </pc:picChg>
       </pc:sldChg>
-      <pc:sldChg chg="addSp delSp modSp mod modAnim">
-        <pc:chgData name="william kokubun" userId="d4688b2ef84ae56b" providerId="LiveId" clId="{8E898EB5-4A95-4865-8D96-AF816AE5B8C3}" dt="2022-11-05T23:38:31.751" v="621" actId="20577"/>
+      <pc:sldChg chg="addSp delSp modSp mod modTransition modAnim">
+        <pc:chgData name="william kokubun" userId="d4688b2ef84ae56b" providerId="LiveId" clId="{8E898EB5-4A95-4865-8D96-AF816AE5B8C3}" dt="2022-11-07T22:53:59.419" v="1243"/>
         <pc:sldMkLst>
           <pc:docMk/>
           <pc:sldMk cId="1043168524" sldId="312"/>
@@ -187,13 +240,29 @@
           </ac:spMkLst>
         </pc:spChg>
         <pc:spChg chg="add mod">
-          <ac:chgData name="william kokubun" userId="d4688b2ef84ae56b" providerId="LiveId" clId="{8E898EB5-4A95-4865-8D96-AF816AE5B8C3}" dt="2022-11-05T23:38:31.751" v="621" actId="20577"/>
+          <ac:chgData name="william kokubun" userId="d4688b2ef84ae56b" providerId="LiveId" clId="{8E898EB5-4A95-4865-8D96-AF816AE5B8C3}" dt="2022-11-07T22:40:37.869" v="1026" actId="1076"/>
           <ac:spMkLst>
             <pc:docMk/>
             <pc:sldMk cId="1043168524" sldId="312"/>
             <ac:spMk id="3" creationId="{6D7F2C44-92E1-685C-6CF1-B2EB4E250AD8}"/>
           </ac:spMkLst>
         </pc:spChg>
+        <pc:spChg chg="add mod">
+          <ac:chgData name="william kokubun" userId="d4688b2ef84ae56b" providerId="LiveId" clId="{8E898EB5-4A95-4865-8D96-AF816AE5B8C3}" dt="2022-11-07T22:40:43.353" v="1028" actId="1076"/>
+          <ac:spMkLst>
+            <pc:docMk/>
+            <pc:sldMk cId="1043168524" sldId="312"/>
+            <ac:spMk id="4" creationId="{373886A4-76DC-69DD-3AC9-73BA6EDC54F8}"/>
+          </ac:spMkLst>
+        </pc:spChg>
+        <pc:picChg chg="add del mod">
+          <ac:chgData name="william kokubun" userId="d4688b2ef84ae56b" providerId="LiveId" clId="{8E898EB5-4A95-4865-8D96-AF816AE5B8C3}" dt="2022-11-07T22:35:53.027" v="833" actId="478"/>
+          <ac:picMkLst>
+            <pc:docMk/>
+            <pc:sldMk cId="1043168524" sldId="312"/>
+            <ac:picMk id="2" creationId="{507F8270-B3F6-6F6C-A2B1-D9B1F80F022E}"/>
+          </ac:picMkLst>
+        </pc:picChg>
         <pc:picChg chg="add del mod">
           <ac:chgData name="william kokubun" userId="d4688b2ef84ae56b" providerId="LiveId" clId="{8E898EB5-4A95-4865-8D96-AF816AE5B8C3}" dt="2022-11-05T22:55:48.869" v="152" actId="478"/>
           <ac:picMkLst>
@@ -203,7 +272,7 @@
           </ac:picMkLst>
         </pc:picChg>
         <pc:picChg chg="add mod">
-          <ac:chgData name="william kokubun" userId="d4688b2ef84ae56b" providerId="LiveId" clId="{8E898EB5-4A95-4865-8D96-AF816AE5B8C3}" dt="2022-11-05T23:05:13.259" v="503" actId="1076"/>
+          <ac:chgData name="william kokubun" userId="d4688b2ef84ae56b" providerId="LiveId" clId="{8E898EB5-4A95-4865-8D96-AF816AE5B8C3}" dt="2022-11-07T22:40:40.384" v="1027" actId="1076"/>
           <ac:picMkLst>
             <pc:docMk/>
             <pc:sldMk cId="1043168524" sldId="312"/>
@@ -211,14 +280,14 @@
           </ac:picMkLst>
         </pc:picChg>
       </pc:sldChg>
-      <pc:sldChg chg="addSp delSp modSp add mod modAnim">
-        <pc:chgData name="william kokubun" userId="d4688b2ef84ae56b" providerId="LiveId" clId="{8E898EB5-4A95-4865-8D96-AF816AE5B8C3}" dt="2022-11-05T23:39:24.708" v="627" actId="20577"/>
+      <pc:sldChg chg="addSp delSp modSp add mod modTransition modAnim">
+        <pc:chgData name="william kokubun" userId="d4688b2ef84ae56b" providerId="LiveId" clId="{8E898EB5-4A95-4865-8D96-AF816AE5B8C3}" dt="2022-11-07T22:54:06.157" v="1244"/>
         <pc:sldMkLst>
           <pc:docMk/>
           <pc:sldMk cId="4144724670" sldId="313"/>
         </pc:sldMkLst>
         <pc:spChg chg="mod">
-          <ac:chgData name="william kokubun" userId="d4688b2ef84ae56b" providerId="LiveId" clId="{8E898EB5-4A95-4865-8D96-AF816AE5B8C3}" dt="2022-11-05T23:39:24.708" v="627" actId="20577"/>
+          <ac:chgData name="william kokubun" userId="d4688b2ef84ae56b" providerId="LiveId" clId="{8E898EB5-4A95-4865-8D96-AF816AE5B8C3}" dt="2022-11-07T22:42:31.590" v="1079" actId="1076"/>
           <ac:spMkLst>
             <pc:docMk/>
             <pc:sldMk cId="4144724670" sldId="313"/>
@@ -258,14 +327,14 @@
           </ac:picMkLst>
         </pc:picChg>
       </pc:sldChg>
-      <pc:sldChg chg="addSp delSp modSp add mod ord modAnim">
-        <pc:chgData name="william kokubun" userId="d4688b2ef84ae56b" providerId="LiveId" clId="{8E898EB5-4A95-4865-8D96-AF816AE5B8C3}" dt="2022-11-05T23:43:48.756" v="644" actId="1076"/>
+      <pc:sldChg chg="addSp delSp modSp add mod ord modTransition modAnim">
+        <pc:chgData name="william kokubun" userId="d4688b2ef84ae56b" providerId="LiveId" clId="{8E898EB5-4A95-4865-8D96-AF816AE5B8C3}" dt="2022-11-07T22:54:15.053" v="1246"/>
         <pc:sldMkLst>
           <pc:docMk/>
           <pc:sldMk cId="2139795004" sldId="314"/>
         </pc:sldMkLst>
         <pc:spChg chg="mod">
-          <ac:chgData name="william kokubun" userId="d4688b2ef84ae56b" providerId="LiveId" clId="{8E898EB5-4A95-4865-8D96-AF816AE5B8C3}" dt="2022-11-05T23:18:10.189" v="528" actId="1076"/>
+          <ac:chgData name="william kokubun" userId="d4688b2ef84ae56b" providerId="LiveId" clId="{8E898EB5-4A95-4865-8D96-AF816AE5B8C3}" dt="2022-11-07T22:45:45.462" v="1151" actId="1076"/>
           <ac:spMkLst>
             <pc:docMk/>
             <pc:sldMk cId="2139795004" sldId="314"/>
@@ -360,6 +429,104 @@
           </ac:picMkLst>
         </pc:picChg>
       </pc:sldChg>
+      <pc:sldChg chg="new del">
+        <pc:chgData name="william kokubun" userId="d4688b2ef84ae56b" providerId="LiveId" clId="{8E898EB5-4A95-4865-8D96-AF816AE5B8C3}" dt="2022-11-07T22:27:22.181" v="650" actId="47"/>
+        <pc:sldMkLst>
+          <pc:docMk/>
+          <pc:sldMk cId="2065280768" sldId="315"/>
+        </pc:sldMkLst>
+      </pc:sldChg>
+      <pc:sldChg chg="add modTransition modAnim">
+        <pc:chgData name="william kokubun" userId="d4688b2ef84ae56b" providerId="LiveId" clId="{8E898EB5-4A95-4865-8D96-AF816AE5B8C3}" dt="2022-11-07T22:53:25.322" v="1241"/>
+        <pc:sldMkLst>
+          <pc:docMk/>
+          <pc:sldMk cId="2562048330" sldId="315"/>
+        </pc:sldMkLst>
+      </pc:sldChg>
+      <pc:sldChg chg="delSp modSp add mod modTransition delAnim">
+        <pc:chgData name="william kokubun" userId="d4688b2ef84ae56b" providerId="LiveId" clId="{8E898EB5-4A95-4865-8D96-AF816AE5B8C3}" dt="2022-11-07T22:54:19.965" v="1247"/>
+        <pc:sldMkLst>
+          <pc:docMk/>
+          <pc:sldMk cId="3400891561" sldId="316"/>
+        </pc:sldMkLst>
+        <pc:spChg chg="mod">
+          <ac:chgData name="william kokubun" userId="d4688b2ef84ae56b" providerId="LiveId" clId="{8E898EB5-4A95-4865-8D96-AF816AE5B8C3}" dt="2022-11-07T22:46:22.606" v="1178" actId="1076"/>
+          <ac:spMkLst>
+            <pc:docMk/>
+            <pc:sldMk cId="3400891561" sldId="316"/>
+            <ac:spMk id="3" creationId="{6D7F2C44-92E1-685C-6CF1-B2EB4E250AD8}"/>
+          </ac:spMkLst>
+        </pc:spChg>
+        <pc:picChg chg="del">
+          <ac:chgData name="william kokubun" userId="d4688b2ef84ae56b" providerId="LiveId" clId="{8E898EB5-4A95-4865-8D96-AF816AE5B8C3}" dt="2022-11-07T22:46:24.999" v="1179" actId="478"/>
+          <ac:picMkLst>
+            <pc:docMk/>
+            <pc:sldMk cId="3400891561" sldId="316"/>
+            <ac:picMk id="14" creationId="{778F51AC-752B-A50C-3DBD-A7BD9B13358C}"/>
+          </ac:picMkLst>
+        </pc:picChg>
+        <pc:picChg chg="del">
+          <ac:chgData name="william kokubun" userId="d4688b2ef84ae56b" providerId="LiveId" clId="{8E898EB5-4A95-4865-8D96-AF816AE5B8C3}" dt="2022-11-07T22:46:26.368" v="1181" actId="478"/>
+          <ac:picMkLst>
+            <pc:docMk/>
+            <pc:sldMk cId="3400891561" sldId="316"/>
+            <ac:picMk id="16" creationId="{0BDAD194-907E-DFB0-A141-552B0165B833}"/>
+          </ac:picMkLst>
+        </pc:picChg>
+        <pc:picChg chg="del">
+          <ac:chgData name="william kokubun" userId="d4688b2ef84ae56b" providerId="LiveId" clId="{8E898EB5-4A95-4865-8D96-AF816AE5B8C3}" dt="2022-11-07T22:46:25.650" v="1180" actId="478"/>
+          <ac:picMkLst>
+            <pc:docMk/>
+            <pc:sldMk cId="3400891561" sldId="316"/>
+            <ac:picMk id="18" creationId="{F9F2D642-2D87-A95E-2ED1-24AB7C68D01D}"/>
+          </ac:picMkLst>
+        </pc:picChg>
+      </pc:sldChg>
+      <pc:sldChg chg="modSp add mod modTransition">
+        <pc:chgData name="william kokubun" userId="d4688b2ef84ae56b" providerId="LiveId" clId="{8E898EB5-4A95-4865-8D96-AF816AE5B8C3}" dt="2022-11-07T22:54:26.717" v="1248"/>
+        <pc:sldMkLst>
+          <pc:docMk/>
+          <pc:sldMk cId="717050879" sldId="317"/>
+        </pc:sldMkLst>
+        <pc:spChg chg="mod">
+          <ac:chgData name="william kokubun" userId="d4688b2ef84ae56b" providerId="LiveId" clId="{8E898EB5-4A95-4865-8D96-AF816AE5B8C3}" dt="2022-11-07T22:46:51.974" v="1198" actId="1076"/>
+          <ac:spMkLst>
+            <pc:docMk/>
+            <pc:sldMk cId="717050879" sldId="317"/>
+            <ac:spMk id="3" creationId="{6D7F2C44-92E1-685C-6CF1-B2EB4E250AD8}"/>
+          </ac:spMkLst>
+        </pc:spChg>
+      </pc:sldChg>
+      <pc:sldChg chg="modSp add mod modTransition">
+        <pc:chgData name="william kokubun" userId="d4688b2ef84ae56b" providerId="LiveId" clId="{8E898EB5-4A95-4865-8D96-AF816AE5B8C3}" dt="2022-11-07T22:54:33.757" v="1249"/>
+        <pc:sldMkLst>
+          <pc:docMk/>
+          <pc:sldMk cId="4213219144" sldId="318"/>
+        </pc:sldMkLst>
+        <pc:spChg chg="mod">
+          <ac:chgData name="william kokubun" userId="d4688b2ef84ae56b" providerId="LiveId" clId="{8E898EB5-4A95-4865-8D96-AF816AE5B8C3}" dt="2022-11-07T22:49:12.286" v="1233" actId="1076"/>
+          <ac:spMkLst>
+            <pc:docMk/>
+            <pc:sldMk cId="4213219144" sldId="318"/>
+            <ac:spMk id="3" creationId="{6D7F2C44-92E1-685C-6CF1-B2EB4E250AD8}"/>
+          </ac:spMkLst>
+        </pc:spChg>
+      </pc:sldChg>
+      <pc:sldChg chg="modSp add mod modTransition">
+        <pc:chgData name="william kokubun" userId="d4688b2ef84ae56b" providerId="LiveId" clId="{8E898EB5-4A95-4865-8D96-AF816AE5B8C3}" dt="2022-11-07T22:54:41.998" v="1250"/>
+        <pc:sldMkLst>
+          <pc:docMk/>
+          <pc:sldMk cId="2874393558" sldId="319"/>
+        </pc:sldMkLst>
+        <pc:spChg chg="mod">
+          <ac:chgData name="william kokubun" userId="d4688b2ef84ae56b" providerId="LiveId" clId="{8E898EB5-4A95-4865-8D96-AF816AE5B8C3}" dt="2022-11-07T22:47:32.062" v="1232" actId="1076"/>
+          <ac:spMkLst>
+            <pc:docMk/>
+            <pc:sldMk cId="2874393558" sldId="319"/>
+            <ac:spMk id="3" creationId="{6D7F2C44-92E1-685C-6CF1-B2EB4E250AD8}"/>
+          </ac:spMkLst>
+        </pc:spChg>
+      </pc:sldChg>
     </pc:docChg>
   </pc:docChgLst>
 </pc:chgInfo>
@@ -447,7 +614,7 @@
           <a:p>
             <a:fld id="{86D7EF7A-7C84-452C-98C8-2624B8AAB901}" type="datetimeFigureOut">
               <a:rPr lang="pt-BR" smtClean="0"/>
-              <a:t>05/11/2022</a:t>
+              <a:t>07/11/2022</a:t>
             </a:fld>
             <a:endParaRPr lang="pt-BR" dirty="0"/>
           </a:p>
@@ -612,7 +779,7 @@
           <a:p>
             <a:fld id="{42F1FC03-2196-4DCB-8924-F68D70992EB6}" type="datetimeFigureOut">
               <a:rPr lang="pt-BR" smtClean="0"/>
-              <a:t>05/11/2022</a:t>
+              <a:t>07/11/2022</a:t>
             </a:fld>
             <a:endParaRPr lang="pt-BR" dirty="0"/>
           </a:p>
@@ -1351,7 +1518,7 @@
             <a:pPr rtl="0"/>
             <a:fld id="{8D7758FC-87E8-4F64-BF34-460BFEF81A97}" type="datetime1">
               <a:rPr lang="pt-BR" noProof="0" smtClean="0"/>
-              <a:t>05/11/2022</a:t>
+              <a:t>07/11/2022</a:t>
             </a:fld>
             <a:endParaRPr lang="pt-BR" noProof="0" dirty="0"/>
           </a:p>
@@ -1557,7 +1724,7 @@
             <a:pPr rtl="0"/>
             <a:fld id="{FD6C025B-2C7E-4E3B-8CEC-4B529E7C068D}" type="datetime1">
               <a:rPr lang="pt-BR" noProof="0" smtClean="0"/>
-              <a:t>05/11/2022</a:t>
+              <a:t>07/11/2022</a:t>
             </a:fld>
             <a:endParaRPr lang="pt-BR" noProof="0" dirty="0"/>
           </a:p>
@@ -2160,7 +2327,7 @@
             <a:pPr rtl="0"/>
             <a:fld id="{08CA6962-0433-41D3-AD4C-16BFD9D28914}" type="datetime1">
               <a:rPr lang="pt-BR" noProof="0" smtClean="0"/>
-              <a:t>05/11/2022</a:t>
+              <a:t>07/11/2022</a:t>
             </a:fld>
             <a:endParaRPr lang="pt-BR" noProof="0" dirty="0"/>
           </a:p>
@@ -2484,7 +2651,7 @@
             <a:pPr rtl="0"/>
             <a:fld id="{75E0A3D8-2548-4316-9A06-E485F26025B4}" type="datetime1">
               <a:rPr lang="pt-BR" noProof="0" smtClean="0"/>
-              <a:t>05/11/2022</a:t>
+              <a:t>07/11/2022</a:t>
             </a:fld>
             <a:endParaRPr lang="pt-BR" noProof="0" dirty="0"/>
           </a:p>
@@ -2925,7 +3092,7 @@
             <a:pPr rtl="0"/>
             <a:fld id="{76FF6E41-DB69-4080-8ABD-C41AFF03B85C}" type="datetime1">
               <a:rPr lang="pt-BR" noProof="0" smtClean="0"/>
-              <a:t>05/11/2022</a:t>
+              <a:t>07/11/2022</a:t>
             </a:fld>
             <a:endParaRPr lang="pt-BR" noProof="0" dirty="0"/>
           </a:p>
@@ -3047,7 +3214,7 @@
             <a:pPr rtl="0"/>
             <a:fld id="{D82677F0-039A-46E6-AE75-561202778A38}" type="datetime1">
               <a:rPr lang="pt-BR" noProof="0" smtClean="0"/>
-              <a:t>05/11/2022</a:t>
+              <a:t>07/11/2022</a:t>
             </a:fld>
             <a:endParaRPr lang="pt-BR" noProof="0" dirty="0"/>
           </a:p>
@@ -3145,7 +3312,7 @@
             <a:pPr rtl="0"/>
             <a:fld id="{9699D4BA-3969-45D2-B0B5-97C28CC89C91}" type="datetime1">
               <a:rPr lang="pt-BR" noProof="0" smtClean="0"/>
-              <a:t>05/11/2022</a:t>
+              <a:t>07/11/2022</a:t>
             </a:fld>
             <a:endParaRPr lang="pt-BR" noProof="0" dirty="0"/>
           </a:p>
@@ -3566,7 +3733,7 @@
             <a:pPr rtl="0"/>
             <a:fld id="{D7892770-2ED2-44D8-9565-F5EAB94A70DA}" type="datetime1">
               <a:rPr lang="pt-BR" noProof="0" smtClean="0"/>
-              <a:t>05/11/2022</a:t>
+              <a:t>07/11/2022</a:t>
             </a:fld>
             <a:endParaRPr lang="pt-BR" noProof="0" dirty="0"/>
           </a:p>
@@ -3831,7 +3998,7 @@
             <a:pPr rtl="0"/>
             <a:fld id="{559FF860-6992-4A40-8BA7-A8EDBB5E3573}" type="datetime1">
               <a:rPr lang="pt-BR" noProof="0" smtClean="0"/>
-              <a:t>05/11/2022</a:t>
+              <a:t>07/11/2022</a:t>
             </a:fld>
             <a:endParaRPr lang="pt-BR" noProof="0" dirty="0"/>
           </a:p>
@@ -4349,7 +4516,7 @@
             <a:pPr rtl="0"/>
             <a:fld id="{8AD83A4F-18F9-4D3C-A6BC-C771A3949B58}" type="datetime1">
               <a:rPr lang="pt-BR" noProof="0" smtClean="0"/>
-              <a:t>05/11/2022</a:t>
+              <a:t>07/11/2022</a:t>
             </a:fld>
             <a:endParaRPr lang="pt-BR" noProof="0" dirty="0"/>
           </a:p>
@@ -4865,7 +5032,7 @@
         </p:nvSpPr>
         <p:spPr>
           <a:xfrm>
-            <a:off x="1053546" y="332600"/>
+            <a:off x="1941442" y="398861"/>
             <a:ext cx="10727635" cy="1371600"/>
           </a:xfrm>
         </p:spPr>
@@ -4882,17 +5049,95 @@
                 </a:solidFill>
                 <a:latin typeface="+mn-lt"/>
               </a:rPr>
-              <a:t>A HISTÓRIA DO 2-TONE SKA</a:t>
+              <a:t>PROJETO INDIVIDUAL</a:t>
+            </a:r>
+          </a:p>
+        </p:txBody>
+      </p:sp>
+      <p:sp>
+        <p:nvSpPr>
+          <p:cNvPr id="3" name="CaixaDeTexto 2">
+            <a:extLst>
+              <a:ext uri="{FF2B5EF4-FFF2-40B4-BE49-F238E27FC236}">
+                <a16:creationId xmlns:a16="http://schemas.microsoft.com/office/drawing/2014/main" id="{A24ECBE8-7B6A-8DEE-4C4C-38FE24DD6365}"/>
+              </a:ext>
+            </a:extLst>
+          </p:cNvPr>
+          <p:cNvSpPr txBox="1"/>
+          <p:nvPr/>
+        </p:nvSpPr>
+        <p:spPr>
+          <a:xfrm>
+            <a:off x="3682270" y="4881175"/>
+            <a:ext cx="5069786" cy="523220"/>
+          </a:xfrm>
+          <a:prstGeom prst="rect">
+            <a:avLst/>
+          </a:prstGeom>
+          <a:noFill/>
+        </p:spPr>
+        <p:txBody>
+          <a:bodyPr wrap="none" rtlCol="0">
+            <a:spAutoFit/>
+          </a:bodyPr>
+          <a:lstStyle/>
+          <a:p>
+            <a:r>
+              <a:rPr lang="pt-BR" sz="2800" dirty="0">
+                <a:solidFill>
+                  <a:schemeClr val="bg1"/>
+                </a:solidFill>
+              </a:rPr>
+              <a:t>William Alexander Kokubun</a:t>
+            </a:r>
+          </a:p>
+        </p:txBody>
+      </p:sp>
+      <p:sp>
+        <p:nvSpPr>
+          <p:cNvPr id="4" name="CaixaDeTexto 3">
+            <a:extLst>
+              <a:ext uri="{FF2B5EF4-FFF2-40B4-BE49-F238E27FC236}">
+                <a16:creationId xmlns:a16="http://schemas.microsoft.com/office/drawing/2014/main" id="{01F8A72D-AF4A-F551-181E-6AEF79963A87}"/>
+              </a:ext>
+            </a:extLst>
+          </p:cNvPr>
+          <p:cNvSpPr txBox="1"/>
+          <p:nvPr/>
+        </p:nvSpPr>
+        <p:spPr>
+          <a:xfrm>
+            <a:off x="4994969" y="5404395"/>
+            <a:ext cx="2444387" cy="523220"/>
+          </a:xfrm>
+          <a:prstGeom prst="rect">
+            <a:avLst/>
+          </a:prstGeom>
+          <a:noFill/>
+        </p:spPr>
+        <p:txBody>
+          <a:bodyPr wrap="none" rtlCol="0">
+            <a:spAutoFit/>
+          </a:bodyPr>
+          <a:lstStyle/>
+          <a:p>
+            <a:r>
+              <a:rPr lang="pt-BR" sz="2800" dirty="0">
+                <a:solidFill>
+                  <a:schemeClr val="bg1"/>
+                </a:solidFill>
+              </a:rPr>
+              <a:t>RA 01222086</a:t>
             </a:r>
           </a:p>
         </p:txBody>
       </p:sp>
       <p:pic>
         <p:nvPicPr>
-          <p:cNvPr id="7" name="Imagem 6" descr="Foto em preto e branco de grupo de pessoas lado a lado&#10;&#10;Descrição gerada automaticamente">
+          <p:cNvPr id="8" name="Imagem 7">
             <a:extLst>
               <a:ext uri="{FF2B5EF4-FFF2-40B4-BE49-F238E27FC236}">
-                <a16:creationId xmlns:a16="http://schemas.microsoft.com/office/drawing/2014/main" id="{AB1FAA1B-13CA-A139-D560-7CD57291327D}"/>
+                <a16:creationId xmlns:a16="http://schemas.microsoft.com/office/drawing/2014/main" id="{FD586C59-F7DE-C32D-F634-D1E5FCE8634F}"/>
               </a:ext>
             </a:extLst>
           </p:cNvPr>
@@ -4909,8 +5154,8 @@
         </p:blipFill>
         <p:spPr>
           <a:xfrm>
-            <a:off x="2972213" y="1674607"/>
-            <a:ext cx="6529595" cy="4527186"/>
+            <a:off x="1222987" y="2568971"/>
+            <a:ext cx="9988353" cy="1905040"/>
           </a:xfrm>
           <a:prstGeom prst="rect">
             <a:avLst/>
@@ -4927,145 +5172,120 @@
   <p:clrMapOvr>
     <a:masterClrMapping/>
   </p:clrMapOvr>
-  <p:timing>
-    <p:tnLst>
-      <p:par>
-        <p:cTn id="1" dur="indefinite" restart="never" nodeType="tmRoot">
-          <p:childTnLst>
-            <p:seq concurrent="1" nextAc="seek">
-              <p:cTn id="2" dur="indefinite" nodeType="mainSeq">
-                <p:childTnLst>
-                  <p:par>
-                    <p:cTn id="3" fill="hold">
-                      <p:stCondLst>
-                        <p:cond delay="indefinite"/>
-                      </p:stCondLst>
-                      <p:childTnLst>
-                        <p:par>
-                          <p:cTn id="4" fill="hold">
-                            <p:stCondLst>
-                              <p:cond delay="0"/>
-                            </p:stCondLst>
-                            <p:childTnLst>
-                              <p:par>
-                                <p:cTn id="5" presetID="16" presetClass="entr" presetSubtype="21" fill="hold" grpId="0" nodeType="clickEffect">
-                                  <p:stCondLst>
-                                    <p:cond delay="0"/>
-                                  </p:stCondLst>
-                                  <p:childTnLst>
-                                    <p:set>
-                                      <p:cBhvr>
-                                        <p:cTn id="6" dur="1" fill="hold">
-                                          <p:stCondLst>
-                                            <p:cond delay="0"/>
-                                          </p:stCondLst>
-                                        </p:cTn>
-                                        <p:tgtEl>
-                                          <p:spTgt spid="2"/>
-                                        </p:tgtEl>
-                                        <p:attrNameLst>
-                                          <p:attrName>style.visibility</p:attrName>
-                                        </p:attrNameLst>
-                                      </p:cBhvr>
-                                      <p:to>
-                                        <p:strVal val="visible"/>
-                                      </p:to>
-                                    </p:set>
-                                    <p:animEffect transition="in" filter="barn(inVertical)">
-                                      <p:cBhvr>
-                                        <p:cTn id="7" dur="500"/>
-                                        <p:tgtEl>
-                                          <p:spTgt spid="2"/>
-                                        </p:tgtEl>
-                                      </p:cBhvr>
-                                    </p:animEffect>
-                                  </p:childTnLst>
-                                </p:cTn>
-                              </p:par>
-                            </p:childTnLst>
-                          </p:cTn>
-                        </p:par>
-                      </p:childTnLst>
-                    </p:cTn>
-                  </p:par>
-                  <p:par>
-                    <p:cTn id="8" fill="hold">
-                      <p:stCondLst>
-                        <p:cond delay="indefinite"/>
-                      </p:stCondLst>
-                      <p:childTnLst>
-                        <p:par>
-                          <p:cTn id="9" fill="hold">
-                            <p:stCondLst>
-                              <p:cond delay="0"/>
-                            </p:stCondLst>
-                            <p:childTnLst>
-                              <p:par>
-                                <p:cTn id="10" presetID="16" presetClass="entr" presetSubtype="21" fill="hold" nodeType="clickEffect">
-                                  <p:stCondLst>
-                                    <p:cond delay="0"/>
-                                  </p:stCondLst>
-                                  <p:childTnLst>
-                                    <p:set>
-                                      <p:cBhvr>
-                                        <p:cTn id="11" dur="1" fill="hold">
-                                          <p:stCondLst>
-                                            <p:cond delay="0"/>
-                                          </p:stCondLst>
-                                        </p:cTn>
-                                        <p:tgtEl>
-                                          <p:spTgt spid="7"/>
-                                        </p:tgtEl>
-                                        <p:attrNameLst>
-                                          <p:attrName>style.visibility</p:attrName>
-                                        </p:attrNameLst>
-                                      </p:cBhvr>
-                                      <p:to>
-                                        <p:strVal val="visible"/>
-                                      </p:to>
-                                    </p:set>
-                                    <p:animEffect transition="in" filter="barn(inVertical)">
-                                      <p:cBhvr>
-                                        <p:cTn id="12" dur="500"/>
-                                        <p:tgtEl>
-                                          <p:spTgt spid="7"/>
-                                        </p:tgtEl>
-                                      </p:cBhvr>
-                                    </p:animEffect>
-                                  </p:childTnLst>
-                                </p:cTn>
-                              </p:par>
-                            </p:childTnLst>
-                          </p:cTn>
-                        </p:par>
-                      </p:childTnLst>
-                    </p:cTn>
-                  </p:par>
-                </p:childTnLst>
-              </p:cTn>
-              <p:prevCondLst>
-                <p:cond evt="onPrev" delay="0">
-                  <p:tgtEl>
-                    <p:sldTgt/>
-                  </p:tgtEl>
-                </p:cond>
-              </p:prevCondLst>
-              <p:nextCondLst>
-                <p:cond evt="onNext" delay="0">
-                  <p:tgtEl>
-                    <p:sldTgt/>
-                  </p:tgtEl>
-                </p:cond>
-              </p:nextCondLst>
-            </p:seq>
-          </p:childTnLst>
-        </p:cTn>
-      </p:par>
-    </p:tnLst>
-    <p:bldLst>
-      <p:bldP spid="2" grpId="0"/>
-    </p:bldLst>
-  </p:timing>
+</p:sld>
+</file>
+
+<file path=ppt/slides/slide10.xml><?xml version="1.0" encoding="utf-8"?>
+<p:sld xmlns:a="http://schemas.openxmlformats.org/drawingml/2006/main" xmlns:r="http://schemas.openxmlformats.org/officeDocument/2006/relationships" xmlns:p="http://schemas.openxmlformats.org/presentationml/2006/main">
+  <p:cSld>
+    <p:spTree>
+      <p:nvGrpSpPr>
+        <p:cNvPr id="1" name=""/>
+        <p:cNvGrpSpPr/>
+        <p:nvPr/>
+      </p:nvGrpSpPr>
+      <p:grpSpPr>
+        <a:xfrm>
+          <a:off x="0" y="0"/>
+          <a:ext cx="0" cy="0"/>
+          <a:chOff x="0" y="0"/>
+          <a:chExt cx="0" cy="0"/>
+        </a:xfrm>
+      </p:grpSpPr>
+      <p:pic>
+        <p:nvPicPr>
+          <p:cNvPr id="5" name="Espaço Reservado para Conteúdo 4" descr="Forma, Retângulo&#10;&#10;Descrição gerada automaticamente">
+            <a:extLst>
+              <a:ext uri="{FF2B5EF4-FFF2-40B4-BE49-F238E27FC236}">
+                <a16:creationId xmlns:a16="http://schemas.microsoft.com/office/drawing/2014/main" id="{A8AE5624-8DD3-8AE7-51AD-FE72F67AB807}"/>
+              </a:ext>
+            </a:extLst>
+          </p:cNvPr>
+          <p:cNvPicPr>
+            <a:picLocks noGrp="1" noChangeAspect="1"/>
+          </p:cNvPicPr>
+          <p:nvPr>
+            <p:ph idx="1"/>
+          </p:nvPr>
+        </p:nvPicPr>
+        <p:blipFill>
+          <a:blip r:embed="rId2"/>
+          <a:stretch>
+            <a:fillRect/>
+          </a:stretch>
+        </p:blipFill>
+        <p:spPr>
+          <a:xfrm>
+            <a:off x="0" y="-1"/>
+            <a:ext cx="12192000" cy="7885043"/>
+          </a:xfrm>
+        </p:spPr>
+      </p:pic>
+      <p:sp>
+        <p:nvSpPr>
+          <p:cNvPr id="3" name="CaixaDeTexto 2">
+            <a:extLst>
+              <a:ext uri="{FF2B5EF4-FFF2-40B4-BE49-F238E27FC236}">
+                <a16:creationId xmlns:a16="http://schemas.microsoft.com/office/drawing/2014/main" id="{6D7F2C44-92E1-685C-6CF1-B2EB4E250AD8}"/>
+              </a:ext>
+            </a:extLst>
+          </p:cNvPr>
+          <p:cNvSpPr txBox="1"/>
+          <p:nvPr/>
+        </p:nvSpPr>
+        <p:spPr>
+          <a:xfrm>
+            <a:off x="3140767" y="379504"/>
+            <a:ext cx="10628242" cy="830997"/>
+          </a:xfrm>
+          <a:prstGeom prst="rect">
+            <a:avLst/>
+          </a:prstGeom>
+          <a:noFill/>
+        </p:spPr>
+        <p:txBody>
+          <a:bodyPr wrap="square" rtlCol="0">
+            <a:spAutoFit/>
+          </a:bodyPr>
+          <a:lstStyle/>
+          <a:p>
+            <a:pPr algn="just"/>
+            <a:r>
+              <a:rPr lang="pt-BR" sz="4800" b="1" dirty="0">
+                <a:effectLst/>
+                <a:ea typeface="Calibri" panose="020F0502020204030204" pitchFamily="34" charset="0"/>
+                <a:cs typeface="Calibri Light" panose="020F0302020204030204" pitchFamily="34" charset="0"/>
+              </a:rPr>
+              <a:t>Muito obrigado!</a:t>
+            </a:r>
+            <a:endParaRPr lang="pt-BR" sz="4800" b="1" dirty="0">
+              <a:effectLst/>
+            </a:endParaRPr>
+          </a:p>
+        </p:txBody>
+      </p:sp>
+    </p:spTree>
+    <p:extLst>
+      <p:ext uri="{BB962C8B-B14F-4D97-AF65-F5344CB8AC3E}">
+        <p14:creationId xmlns:p14="http://schemas.microsoft.com/office/powerpoint/2010/main" val="2874393558"/>
+      </p:ext>
+    </p:extLst>
+  </p:cSld>
+  <p:clrMapOvr>
+    <a:masterClrMapping/>
+  </p:clrMapOvr>
+  <mc:AlternateContent xmlns:mc="http://schemas.openxmlformats.org/markup-compatibility/2006">
+    <mc:Choice xmlns:p14="http://schemas.microsoft.com/office/powerpoint/2010/main" Requires="p14">
+      <p:transition spd="slow" p14:dur="1600">
+        <p:blinds dir="vert"/>
+      </p:transition>
+    </mc:Choice>
+    <mc:Fallback>
+      <p:transition spd="slow">
+        <p:blinds dir="vert"/>
+      </p:transition>
+    </mc:Fallback>
+  </mc:AlternateContent>
 </p:sld>
 </file>
 
@@ -5115,12 +5335,52 @@
           </a:xfrm>
         </p:spPr>
       </p:pic>
+      <p:sp>
+        <p:nvSpPr>
+          <p:cNvPr id="2" name="Título 1">
+            <a:extLst>
+              <a:ext uri="{FF2B5EF4-FFF2-40B4-BE49-F238E27FC236}">
+                <a16:creationId xmlns:a16="http://schemas.microsoft.com/office/drawing/2014/main" id="{26D8BE54-5D43-E7D0-949C-0486BBEF2B3C}"/>
+              </a:ext>
+            </a:extLst>
+          </p:cNvPr>
+          <p:cNvSpPr>
+            <a:spLocks noGrp="1"/>
+          </p:cNvSpPr>
+          <p:nvPr>
+            <p:ph type="title"/>
+          </p:nvPr>
+        </p:nvSpPr>
+        <p:spPr>
+          <a:xfrm>
+            <a:off x="1053546" y="332600"/>
+            <a:ext cx="10727635" cy="1371600"/>
+          </a:xfrm>
+        </p:spPr>
+        <p:txBody>
+          <a:bodyPr>
+            <a:normAutofit/>
+          </a:bodyPr>
+          <a:lstStyle/>
+          <a:p>
+            <a:r>
+              <a:rPr lang="pt-BR" sz="5400" b="1" dirty="0">
+                <a:solidFill>
+                  <a:schemeClr val="tx1"/>
+                </a:solidFill>
+                <a:latin typeface="+mn-lt"/>
+              </a:rPr>
+              <a:t>A HISTÓRIA DO 2-TONE SKA</a:t>
+            </a:r>
+          </a:p>
+        </p:txBody>
+      </p:sp>
       <p:pic>
         <p:nvPicPr>
-          <p:cNvPr id="4" name="Imagem 3" descr="Foto preta e branca de pessoas ao lado de mala de viagem&#10;&#10;Descrição gerada automaticamente">
+          <p:cNvPr id="7" name="Imagem 6" descr="Foto em preto e branco de grupo de pessoas lado a lado&#10;&#10;Descrição gerada automaticamente">
             <a:extLst>
               <a:ext uri="{FF2B5EF4-FFF2-40B4-BE49-F238E27FC236}">
-                <a16:creationId xmlns:a16="http://schemas.microsoft.com/office/drawing/2014/main" id="{B3AC035D-7E3D-CAA6-73A5-F3F310BEACD4}"/>
+                <a16:creationId xmlns:a16="http://schemas.microsoft.com/office/drawing/2014/main" id="{AB1FAA1B-13CA-A139-D560-7CD57291327D}"/>
               </a:ext>
             </a:extLst>
           </p:cNvPr>
@@ -5137,251 +5397,36 @@
         </p:blipFill>
         <p:spPr>
           <a:xfrm>
-            <a:off x="2869096" y="309295"/>
-            <a:ext cx="6858000" cy="3857625"/>
+            <a:off x="2831202" y="1425904"/>
+            <a:ext cx="6529595" cy="4527186"/>
           </a:xfrm>
           <a:prstGeom prst="rect">
             <a:avLst/>
           </a:prstGeom>
         </p:spPr>
       </p:pic>
-      <p:sp>
-        <p:nvSpPr>
-          <p:cNvPr id="7" name="CaixaDeTexto 6">
-            <a:extLst>
-              <a:ext uri="{FF2B5EF4-FFF2-40B4-BE49-F238E27FC236}">
-                <a16:creationId xmlns:a16="http://schemas.microsoft.com/office/drawing/2014/main" id="{DC983F06-E954-7EEF-BFD6-EF7DD7CA5818}"/>
-              </a:ext>
-            </a:extLst>
-          </p:cNvPr>
-          <p:cNvSpPr txBox="1"/>
-          <p:nvPr/>
-        </p:nvSpPr>
-        <p:spPr>
-          <a:xfrm>
-            <a:off x="894522" y="4476215"/>
-            <a:ext cx="11045687" cy="1754326"/>
-          </a:xfrm>
-          <a:prstGeom prst="rect">
-            <a:avLst/>
-          </a:prstGeom>
-          <a:noFill/>
-        </p:spPr>
-        <p:txBody>
-          <a:bodyPr wrap="square" rtlCol="0">
-            <a:spAutoFit/>
-          </a:bodyPr>
-          <a:lstStyle/>
-          <a:p>
-            <a:pPr algn="just"/>
-            <a:r>
-              <a:rPr lang="pt-BR" b="0" dirty="0">
-                <a:solidFill>
-                  <a:srgbClr val="F8F8F2"/>
-                </a:solidFill>
-                <a:effectLst/>
-                <a:latin typeface="Consolas" panose="020B0609020204030204" pitchFamily="49" charset="0"/>
-              </a:rPr>
-              <a:t>Em 1950, imigrantes caribenhos chegaram à Grã-Bretanha e enfrentam um preconceito imediato, tornando-se incrivelmente difícil para eles encontrarem moradia. Durante esse período, não havia legislação antidiscriminação para impedir que os proprietários se recusassem a aceitar inquilinos negros. Muitos imigrantes negros são obrigados a viver em áreas de favelas das cidades, onde a moradia é de péssima qualidade e há problemas de criminalidade, violência e prostituição.</a:t>
-            </a:r>
-          </a:p>
-        </p:txBody>
-      </p:sp>
     </p:spTree>
     <p:extLst>
       <p:ext uri="{BB962C8B-B14F-4D97-AF65-F5344CB8AC3E}">
-        <p14:creationId xmlns:p14="http://schemas.microsoft.com/office/powerpoint/2010/main" val="1986591939"/>
+        <p14:creationId xmlns:p14="http://schemas.microsoft.com/office/powerpoint/2010/main" val="2562048330"/>
       </p:ext>
     </p:extLst>
   </p:cSld>
   <p:clrMapOvr>
     <a:masterClrMapping/>
   </p:clrMapOvr>
-  <p:timing>
-    <p:tnLst>
-      <p:par>
-        <p:cTn id="1" dur="indefinite" restart="never" nodeType="tmRoot">
-          <p:childTnLst>
-            <p:seq concurrent="1" nextAc="seek">
-              <p:cTn id="2" dur="indefinite" nodeType="mainSeq">
-                <p:childTnLst>
-                  <p:par>
-                    <p:cTn id="3" fill="hold">
-                      <p:stCondLst>
-                        <p:cond delay="indefinite"/>
-                      </p:stCondLst>
-                      <p:childTnLst>
-                        <p:par>
-                          <p:cTn id="4" fill="hold">
-                            <p:stCondLst>
-                              <p:cond delay="0"/>
-                            </p:stCondLst>
-                            <p:childTnLst>
-                              <p:par>
-                                <p:cTn id="5" presetID="42" presetClass="entr" presetSubtype="0" fill="hold" grpId="0" nodeType="clickEffect">
-                                  <p:stCondLst>
-                                    <p:cond delay="0"/>
-                                  </p:stCondLst>
-                                  <p:childTnLst>
-                                    <p:set>
-                                      <p:cBhvr>
-                                        <p:cTn id="6" dur="1" fill="hold">
-                                          <p:stCondLst>
-                                            <p:cond delay="0"/>
-                                          </p:stCondLst>
-                                        </p:cTn>
-                                        <p:tgtEl>
-                                          <p:spTgt spid="7"/>
-                                        </p:tgtEl>
-                                        <p:attrNameLst>
-                                          <p:attrName>style.visibility</p:attrName>
-                                        </p:attrNameLst>
-                                      </p:cBhvr>
-                                      <p:to>
-                                        <p:strVal val="visible"/>
-                                      </p:to>
-                                    </p:set>
-                                    <p:animEffect transition="in" filter="fade">
-                                      <p:cBhvr>
-                                        <p:cTn id="7" dur="1000"/>
-                                        <p:tgtEl>
-                                          <p:spTgt spid="7"/>
-                                        </p:tgtEl>
-                                      </p:cBhvr>
-                                    </p:animEffect>
-                                    <p:anim calcmode="lin" valueType="num">
-                                      <p:cBhvr>
-                                        <p:cTn id="8" dur="1000" fill="hold"/>
-                                        <p:tgtEl>
-                                          <p:spTgt spid="7"/>
-                                        </p:tgtEl>
-                                        <p:attrNameLst>
-                                          <p:attrName>ppt_x</p:attrName>
-                                        </p:attrNameLst>
-                                      </p:cBhvr>
-                                      <p:tavLst>
-                                        <p:tav tm="0">
-                                          <p:val>
-                                            <p:strVal val="#ppt_x"/>
-                                          </p:val>
-                                        </p:tav>
-                                        <p:tav tm="100000">
-                                          <p:val>
-                                            <p:strVal val="#ppt_x"/>
-                                          </p:val>
-                                        </p:tav>
-                                      </p:tavLst>
-                                    </p:anim>
-                                    <p:anim calcmode="lin" valueType="num">
-                                      <p:cBhvr>
-                                        <p:cTn id="9" dur="1000" fill="hold"/>
-                                        <p:tgtEl>
-                                          <p:spTgt spid="7"/>
-                                        </p:tgtEl>
-                                        <p:attrNameLst>
-                                          <p:attrName>ppt_y</p:attrName>
-                                        </p:attrNameLst>
-                                      </p:cBhvr>
-                                      <p:tavLst>
-                                        <p:tav tm="0">
-                                          <p:val>
-                                            <p:strVal val="#ppt_y+.1"/>
-                                          </p:val>
-                                        </p:tav>
-                                        <p:tav tm="100000">
-                                          <p:val>
-                                            <p:strVal val="#ppt_y"/>
-                                          </p:val>
-                                        </p:tav>
-                                      </p:tavLst>
-                                    </p:anim>
-                                  </p:childTnLst>
-                                </p:cTn>
-                              </p:par>
-                            </p:childTnLst>
-                          </p:cTn>
-                        </p:par>
-                      </p:childTnLst>
-                    </p:cTn>
-                  </p:par>
-                  <p:par>
-                    <p:cTn id="10" fill="hold">
-                      <p:stCondLst>
-                        <p:cond delay="indefinite"/>
-                      </p:stCondLst>
-                      <p:childTnLst>
-                        <p:par>
-                          <p:cTn id="11" fill="hold">
-                            <p:stCondLst>
-                              <p:cond delay="0"/>
-                            </p:stCondLst>
-                            <p:childTnLst>
-                              <p:par>
-                                <p:cTn id="12" presetID="10" presetClass="entr" presetSubtype="0" fill="hold" nodeType="clickEffect">
-                                  <p:stCondLst>
-                                    <p:cond delay="0"/>
-                                  </p:stCondLst>
-                                  <p:childTnLst>
-                                    <p:set>
-                                      <p:cBhvr>
-                                        <p:cTn id="13" dur="1" fill="hold">
-                                          <p:stCondLst>
-                                            <p:cond delay="0"/>
-                                          </p:stCondLst>
-                                        </p:cTn>
-                                        <p:tgtEl>
-                                          <p:spTgt spid="4"/>
-                                        </p:tgtEl>
-                                        <p:attrNameLst>
-                                          <p:attrName>style.visibility</p:attrName>
-                                        </p:attrNameLst>
-                                      </p:cBhvr>
-                                      <p:to>
-                                        <p:strVal val="visible"/>
-                                      </p:to>
-                                    </p:set>
-                                    <p:animEffect transition="in" filter="fade">
-                                      <p:cBhvr>
-                                        <p:cTn id="14" dur="500"/>
-                                        <p:tgtEl>
-                                          <p:spTgt spid="4"/>
-                                        </p:tgtEl>
-                                      </p:cBhvr>
-                                    </p:animEffect>
-                                  </p:childTnLst>
-                                </p:cTn>
-                              </p:par>
-                            </p:childTnLst>
-                          </p:cTn>
-                        </p:par>
-                      </p:childTnLst>
-                    </p:cTn>
-                  </p:par>
-                </p:childTnLst>
-              </p:cTn>
-              <p:prevCondLst>
-                <p:cond evt="onPrev" delay="0">
-                  <p:tgtEl>
-                    <p:sldTgt/>
-                  </p:tgtEl>
-                </p:cond>
-              </p:prevCondLst>
-              <p:nextCondLst>
-                <p:cond evt="onNext" delay="0">
-                  <p:tgtEl>
-                    <p:sldTgt/>
-                  </p:tgtEl>
-                </p:cond>
-              </p:nextCondLst>
-            </p:seq>
-          </p:childTnLst>
-        </p:cTn>
-      </p:par>
-    </p:tnLst>
-    <p:bldLst>
-      <p:bldP spid="7" grpId="0"/>
-    </p:bldLst>
-  </p:timing>
+  <mc:AlternateContent xmlns:mc="http://schemas.openxmlformats.org/markup-compatibility/2006">
+    <mc:Choice xmlns:p15="http://schemas.microsoft.com/office/powerpoint/2012/main" Requires="p15">
+      <p:transition xmlns:p14="http://schemas.microsoft.com/office/powerpoint/2010/main" spd="slow" p14:dur="6000">
+        <p15:prstTrans prst="curtains"/>
+      </p:transition>
+    </mc:Choice>
+    <mc:Fallback>
+      <p:transition spd="slow">
+        <p:fade/>
+      </p:transition>
+    </mc:Fallback>
+  </mc:AlternateContent>
 </p:sld>
 </file>
 
@@ -5431,51 +5476,12 @@
           </a:xfrm>
         </p:spPr>
       </p:pic>
-      <p:sp>
-        <p:nvSpPr>
-          <p:cNvPr id="3" name="CaixaDeTexto 2">
+      <p:pic>
+        <p:nvPicPr>
+          <p:cNvPr id="4" name="Imagem 3" descr="Foto preta e branca de pessoas ao lado de mala de viagem&#10;&#10;Descrição gerada automaticamente">
             <a:extLst>
               <a:ext uri="{FF2B5EF4-FFF2-40B4-BE49-F238E27FC236}">
-                <a16:creationId xmlns:a16="http://schemas.microsoft.com/office/drawing/2014/main" id="{6D7F2C44-92E1-685C-6CF1-B2EB4E250AD8}"/>
-              </a:ext>
-            </a:extLst>
-          </p:cNvPr>
-          <p:cNvSpPr txBox="1"/>
-          <p:nvPr/>
-        </p:nvSpPr>
-        <p:spPr>
-          <a:xfrm>
-            <a:off x="901149" y="410817"/>
-            <a:ext cx="10933044" cy="1754326"/>
-          </a:xfrm>
-          <a:prstGeom prst="rect">
-            <a:avLst/>
-          </a:prstGeom>
-          <a:noFill/>
-        </p:spPr>
-        <p:txBody>
-          <a:bodyPr wrap="square" rtlCol="0">
-            <a:spAutoFit/>
-          </a:bodyPr>
-          <a:lstStyle/>
-          <a:p>
-            <a:pPr algn="just"/>
-            <a:r>
-              <a:rPr lang="pt-BR" b="0" dirty="0">
-                <a:effectLst/>
-                <a:latin typeface="Consolas" panose="020B0609020204030204" pitchFamily="49" charset="0"/>
-              </a:rPr>
-              <a:t>Em 1980, na Grã-Bretanha, a injustiça social não mostrava sinais de melhora e o racismo era abundante. Os negros eram vítimas de violência racista nas mãos de grupos de extrema-direita, como a chamada “Frente Nacional”. Durante essa época, era até comum que jogadores negros de futebol fossem submetidos a cânticos racistas de membros da torcida. Embora, infelizmente, eventos recentes mostrem que isso ainda acontece nos dias modernos.</a:t>
-            </a:r>
-          </a:p>
-        </p:txBody>
-      </p:sp>
-      <p:pic>
-        <p:nvPicPr>
-          <p:cNvPr id="8" name="Imagem 7" descr="Foto em preto e branco de grupo de pessoas andando na rua&#10;&#10;Descrição gerada automaticamente">
-            <a:extLst>
-              <a:ext uri="{FF2B5EF4-FFF2-40B4-BE49-F238E27FC236}">
-                <a16:creationId xmlns:a16="http://schemas.microsoft.com/office/drawing/2014/main" id="{473C73D1-C728-1EA1-BBD1-2005290E49B7}"/>
+                <a16:creationId xmlns:a16="http://schemas.microsoft.com/office/drawing/2014/main" id="{B3AC035D-7E3D-CAA6-73A5-F3F310BEACD4}"/>
               </a:ext>
             </a:extLst>
           </p:cNvPr>
@@ -5492,163 +5498,128 @@
         </p:blipFill>
         <p:spPr>
           <a:xfrm>
-            <a:off x="3137453" y="2115343"/>
-            <a:ext cx="6460435" cy="4726057"/>
+            <a:off x="2667000" y="1319427"/>
+            <a:ext cx="6858000" cy="3857625"/>
           </a:xfrm>
           <a:prstGeom prst="rect">
             <a:avLst/>
           </a:prstGeom>
         </p:spPr>
       </p:pic>
+      <p:sp>
+        <p:nvSpPr>
+          <p:cNvPr id="7" name="CaixaDeTexto 6">
+            <a:extLst>
+              <a:ext uri="{FF2B5EF4-FFF2-40B4-BE49-F238E27FC236}">
+                <a16:creationId xmlns:a16="http://schemas.microsoft.com/office/drawing/2014/main" id="{DC983F06-E954-7EEF-BFD6-EF7DD7CA5818}"/>
+              </a:ext>
+            </a:extLst>
+          </p:cNvPr>
+          <p:cNvSpPr txBox="1"/>
+          <p:nvPr/>
+        </p:nvSpPr>
+        <p:spPr>
+          <a:xfrm>
+            <a:off x="1302026" y="5346609"/>
+            <a:ext cx="9992139" cy="1015663"/>
+          </a:xfrm>
+          <a:prstGeom prst="rect">
+            <a:avLst/>
+          </a:prstGeom>
+          <a:noFill/>
+        </p:spPr>
+        <p:txBody>
+          <a:bodyPr wrap="square" rtlCol="0">
+            <a:spAutoFit/>
+          </a:bodyPr>
+          <a:lstStyle/>
+          <a:p>
+            <a:pPr algn="just"/>
+            <a:r>
+              <a:rPr lang="pt-BR" sz="3000" b="1" dirty="0">
+                <a:solidFill>
+                  <a:srgbClr val="F8F8F2"/>
+                </a:solidFill>
+                <a:latin typeface="Consolas" panose="020B0609020204030204" pitchFamily="49" charset="0"/>
+              </a:rPr>
+              <a:t>A chegada da “</a:t>
+            </a:r>
+            <a:r>
+              <a:rPr lang="pt-BR" sz="3000" b="1" dirty="0" err="1">
+                <a:solidFill>
+                  <a:srgbClr val="F8F8F2"/>
+                </a:solidFill>
+                <a:latin typeface="Consolas" panose="020B0609020204030204" pitchFamily="49" charset="0"/>
+              </a:rPr>
+              <a:t>Windbrush</a:t>
+            </a:r>
+            <a:r>
+              <a:rPr lang="pt-BR" sz="3000" b="1" dirty="0">
+                <a:solidFill>
+                  <a:srgbClr val="F8F8F2"/>
+                </a:solidFill>
+                <a:latin typeface="Consolas" panose="020B0609020204030204" pitchFamily="49" charset="0"/>
+              </a:rPr>
+              <a:t> Generation” na Grã-Bretanha</a:t>
+            </a:r>
+            <a:endParaRPr lang="pt-BR" sz="3000" b="1" dirty="0">
+              <a:solidFill>
+                <a:srgbClr val="F8F8F2"/>
+              </a:solidFill>
+              <a:effectLst/>
+              <a:latin typeface="Consolas" panose="020B0609020204030204" pitchFamily="49" charset="0"/>
+            </a:endParaRPr>
+          </a:p>
+        </p:txBody>
+      </p:sp>
+      <p:sp>
+        <p:nvSpPr>
+          <p:cNvPr id="2" name="CaixaDeTexto 1">
+            <a:extLst>
+              <a:ext uri="{FF2B5EF4-FFF2-40B4-BE49-F238E27FC236}">
+                <a16:creationId xmlns:a16="http://schemas.microsoft.com/office/drawing/2014/main" id="{87A2E33D-F8E3-A5BF-DD5C-214042BF7732}"/>
+              </a:ext>
+            </a:extLst>
+          </p:cNvPr>
+          <p:cNvSpPr txBox="1"/>
+          <p:nvPr/>
+        </p:nvSpPr>
+        <p:spPr>
+          <a:xfrm>
+            <a:off x="5016217" y="147464"/>
+            <a:ext cx="2159566" cy="1107996"/>
+          </a:xfrm>
+          <a:prstGeom prst="rect">
+            <a:avLst/>
+          </a:prstGeom>
+          <a:noFill/>
+        </p:spPr>
+        <p:txBody>
+          <a:bodyPr wrap="none" rtlCol="0">
+            <a:spAutoFit/>
+          </a:bodyPr>
+          <a:lstStyle/>
+          <a:p>
+            <a:r>
+              <a:rPr lang="pt-BR" sz="6600" b="1" dirty="0"/>
+              <a:t>1950</a:t>
+            </a:r>
+          </a:p>
+        </p:txBody>
+      </p:sp>
     </p:spTree>
     <p:extLst>
       <p:ext uri="{BB962C8B-B14F-4D97-AF65-F5344CB8AC3E}">
-        <p14:creationId xmlns:p14="http://schemas.microsoft.com/office/powerpoint/2010/main" val="1043168524"/>
+        <p14:creationId xmlns:p14="http://schemas.microsoft.com/office/powerpoint/2010/main" val="1986591939"/>
       </p:ext>
     </p:extLst>
   </p:cSld>
   <p:clrMapOvr>
     <a:masterClrMapping/>
   </p:clrMapOvr>
-  <p:timing>
-    <p:tnLst>
-      <p:par>
-        <p:cTn id="1" dur="indefinite" restart="never" nodeType="tmRoot">
-          <p:childTnLst>
-            <p:seq concurrent="1" nextAc="seek">
-              <p:cTn id="2" dur="indefinite" nodeType="mainSeq">
-                <p:childTnLst>
-                  <p:par>
-                    <p:cTn id="3" fill="hold">
-                      <p:stCondLst>
-                        <p:cond delay="indefinite"/>
-                      </p:stCondLst>
-                      <p:childTnLst>
-                        <p:par>
-                          <p:cTn id="4" fill="hold">
-                            <p:stCondLst>
-                              <p:cond delay="0"/>
-                            </p:stCondLst>
-                            <p:childTnLst>
-                              <p:par>
-                                <p:cTn id="5" presetID="6" presetClass="entr" presetSubtype="16" fill="hold" grpId="0" nodeType="clickEffect">
-                                  <p:stCondLst>
-                                    <p:cond delay="0"/>
-                                  </p:stCondLst>
-                                  <p:childTnLst>
-                                    <p:set>
-                                      <p:cBhvr>
-                                        <p:cTn id="6" dur="1" fill="hold">
-                                          <p:stCondLst>
-                                            <p:cond delay="0"/>
-                                          </p:stCondLst>
-                                        </p:cTn>
-                                        <p:tgtEl>
-                                          <p:spTgt spid="3"/>
-                                        </p:tgtEl>
-                                        <p:attrNameLst>
-                                          <p:attrName>style.visibility</p:attrName>
-                                        </p:attrNameLst>
-                                      </p:cBhvr>
-                                      <p:to>
-                                        <p:strVal val="visible"/>
-                                      </p:to>
-                                    </p:set>
-                                    <p:animEffect transition="in" filter="circle(in)">
-                                      <p:cBhvr>
-                                        <p:cTn id="7" dur="2000"/>
-                                        <p:tgtEl>
-                                          <p:spTgt spid="3"/>
-                                        </p:tgtEl>
-                                      </p:cBhvr>
-                                    </p:animEffect>
-                                  </p:childTnLst>
-                                </p:cTn>
-                              </p:par>
-                            </p:childTnLst>
-                          </p:cTn>
-                        </p:par>
-                      </p:childTnLst>
-                    </p:cTn>
-                  </p:par>
-                  <p:par>
-                    <p:cTn id="8" fill="hold">
-                      <p:stCondLst>
-                        <p:cond delay="indefinite"/>
-                      </p:stCondLst>
-                      <p:childTnLst>
-                        <p:par>
-                          <p:cTn id="9" fill="hold">
-                            <p:stCondLst>
-                              <p:cond delay="0"/>
-                            </p:stCondLst>
-                            <p:childTnLst>
-                              <p:par>
-                                <p:cTn id="10" presetID="10" presetClass="entr" presetSubtype="0" fill="hold" nodeType="clickEffect">
-                                  <p:stCondLst>
-                                    <p:cond delay="0"/>
-                                  </p:stCondLst>
-                                  <p:childTnLst>
-                                    <p:set>
-                                      <p:cBhvr>
-                                        <p:cTn id="11" dur="1" fill="hold">
-                                          <p:stCondLst>
-                                            <p:cond delay="0"/>
-                                          </p:stCondLst>
-                                        </p:cTn>
-                                        <p:tgtEl>
-                                          <p:spTgt spid="8"/>
-                                        </p:tgtEl>
-                                        <p:attrNameLst>
-                                          <p:attrName>style.visibility</p:attrName>
-                                        </p:attrNameLst>
-                                      </p:cBhvr>
-                                      <p:to>
-                                        <p:strVal val="visible"/>
-                                      </p:to>
-                                    </p:set>
-                                    <p:animEffect transition="in" filter="fade">
-                                      <p:cBhvr>
-                                        <p:cTn id="12" dur="500"/>
-                                        <p:tgtEl>
-                                          <p:spTgt spid="8"/>
-                                        </p:tgtEl>
-                                      </p:cBhvr>
-                                    </p:animEffect>
-                                  </p:childTnLst>
-                                </p:cTn>
-                              </p:par>
-                            </p:childTnLst>
-                          </p:cTn>
-                        </p:par>
-                      </p:childTnLst>
-                    </p:cTn>
-                  </p:par>
-                </p:childTnLst>
-              </p:cTn>
-              <p:prevCondLst>
-                <p:cond evt="onPrev" delay="0">
-                  <p:tgtEl>
-                    <p:sldTgt/>
-                  </p:tgtEl>
-                </p:cond>
-              </p:prevCondLst>
-              <p:nextCondLst>
-                <p:cond evt="onNext" delay="0">
-                  <p:tgtEl>
-                    <p:sldTgt/>
-                  </p:tgtEl>
-                </p:cond>
-              </p:nextCondLst>
-            </p:seq>
-          </p:childTnLst>
-        </p:cTn>
-      </p:par>
-    </p:tnLst>
-    <p:bldLst>
-      <p:bldP spid="3" grpId="0"/>
-    </p:bldLst>
-  </p:timing>
+  <p:transition spd="slow">
+    <p:push dir="u"/>
+  </p:transition>
 </p:sld>
 </file>
 
@@ -5712,8 +5683,8 @@
         </p:nvSpPr>
         <p:spPr>
           <a:xfrm>
-            <a:off x="940905" y="4532242"/>
-            <a:ext cx="10933044" cy="2031325"/>
+            <a:off x="1364975" y="503674"/>
+            <a:ext cx="10088217" cy="1323439"/>
           </a:xfrm>
           <a:prstGeom prst="rect">
             <a:avLst/>
@@ -5728,95 +5699,210 @@
           <a:p>
             <a:pPr algn="just"/>
             <a:r>
-              <a:rPr lang="pt-BR" b="0" dirty="0">
+              <a:rPr lang="pt-BR" sz="4000" b="1" dirty="0">
+                <a:effectLst/>
+              </a:rPr>
+              <a:t>A luta </a:t>
+            </a:r>
+            <a:r>
+              <a:rPr lang="pt-BR" sz="4000" b="1" dirty="0" err="1">
+                <a:effectLst/>
+              </a:rPr>
+              <a:t>anti-racista</a:t>
+            </a:r>
+            <a:r>
+              <a:rPr lang="pt-BR" sz="4000" b="1" dirty="0">
+                <a:effectLst/>
+              </a:rPr>
+              <a:t> contra a “Frente Nacional”</a:t>
+            </a:r>
+          </a:p>
+        </p:txBody>
+      </p:sp>
+      <p:pic>
+        <p:nvPicPr>
+          <p:cNvPr id="8" name="Imagem 7" descr="Foto em preto e branco de grupo de pessoas andando na rua&#10;&#10;Descrição gerada automaticamente">
+            <a:extLst>
+              <a:ext uri="{FF2B5EF4-FFF2-40B4-BE49-F238E27FC236}">
+                <a16:creationId xmlns:a16="http://schemas.microsoft.com/office/drawing/2014/main" id="{473C73D1-C728-1EA1-BBD1-2005290E49B7}"/>
+              </a:ext>
+            </a:extLst>
+          </p:cNvPr>
+          <p:cNvPicPr>
+            <a:picLocks noChangeAspect="1"/>
+          </p:cNvPicPr>
+          <p:nvPr/>
+        </p:nvPicPr>
+        <p:blipFill>
+          <a:blip r:embed="rId3"/>
+          <a:stretch>
+            <a:fillRect/>
+          </a:stretch>
+        </p:blipFill>
+        <p:spPr>
+          <a:xfrm>
+            <a:off x="4886739" y="1505743"/>
+            <a:ext cx="6460435" cy="4726057"/>
+          </a:xfrm>
+          <a:prstGeom prst="rect">
+            <a:avLst/>
+          </a:prstGeom>
+        </p:spPr>
+      </p:pic>
+      <p:sp>
+        <p:nvSpPr>
+          <p:cNvPr id="4" name="CaixaDeTexto 3">
+            <a:extLst>
+              <a:ext uri="{FF2B5EF4-FFF2-40B4-BE49-F238E27FC236}">
+                <a16:creationId xmlns:a16="http://schemas.microsoft.com/office/drawing/2014/main" id="{373886A4-76DC-69DD-3AC9-73BA6EDC54F8}"/>
+              </a:ext>
+            </a:extLst>
+          </p:cNvPr>
+          <p:cNvSpPr txBox="1"/>
+          <p:nvPr/>
+        </p:nvSpPr>
+        <p:spPr>
+          <a:xfrm>
+            <a:off x="1861508" y="4095784"/>
+            <a:ext cx="2180405" cy="1107996"/>
+          </a:xfrm>
+          <a:prstGeom prst="rect">
+            <a:avLst/>
+          </a:prstGeom>
+          <a:noFill/>
+        </p:spPr>
+        <p:txBody>
+          <a:bodyPr wrap="none" rtlCol="0">
+            <a:spAutoFit/>
+          </a:bodyPr>
+          <a:lstStyle/>
+          <a:p>
+            <a:r>
+              <a:rPr lang="pt-BR" sz="6600" b="1" dirty="0">
+                <a:solidFill>
+                  <a:schemeClr val="bg1"/>
+                </a:solidFill>
+              </a:rPr>
+              <a:t>1980</a:t>
+            </a:r>
+          </a:p>
+        </p:txBody>
+      </p:sp>
+    </p:spTree>
+    <p:extLst>
+      <p:ext uri="{BB962C8B-B14F-4D97-AF65-F5344CB8AC3E}">
+        <p14:creationId xmlns:p14="http://schemas.microsoft.com/office/powerpoint/2010/main" val="1043168524"/>
+      </p:ext>
+    </p:extLst>
+  </p:cSld>
+  <p:clrMapOvr>
+    <a:masterClrMapping/>
+  </p:clrMapOvr>
+  <p:transition spd="slow">
+    <p:cover/>
+  </p:transition>
+</p:sld>
+</file>
+
+<file path=ppt/slides/slide5.xml><?xml version="1.0" encoding="utf-8"?>
+<p:sld xmlns:a="http://schemas.openxmlformats.org/drawingml/2006/main" xmlns:r="http://schemas.openxmlformats.org/officeDocument/2006/relationships" xmlns:p="http://schemas.openxmlformats.org/presentationml/2006/main">
+  <p:cSld>
+    <p:spTree>
+      <p:nvGrpSpPr>
+        <p:cNvPr id="1" name=""/>
+        <p:cNvGrpSpPr/>
+        <p:nvPr/>
+      </p:nvGrpSpPr>
+      <p:grpSpPr>
+        <a:xfrm>
+          <a:off x="0" y="0"/>
+          <a:ext cx="0" cy="0"/>
+          <a:chOff x="0" y="0"/>
+          <a:chExt cx="0" cy="0"/>
+        </a:xfrm>
+      </p:grpSpPr>
+      <p:pic>
+        <p:nvPicPr>
+          <p:cNvPr id="5" name="Espaço Reservado para Conteúdo 4" descr="Forma, Retângulo&#10;&#10;Descrição gerada automaticamente">
+            <a:extLst>
+              <a:ext uri="{FF2B5EF4-FFF2-40B4-BE49-F238E27FC236}">
+                <a16:creationId xmlns:a16="http://schemas.microsoft.com/office/drawing/2014/main" id="{A8AE5624-8DD3-8AE7-51AD-FE72F67AB807}"/>
+              </a:ext>
+            </a:extLst>
+          </p:cNvPr>
+          <p:cNvPicPr>
+            <a:picLocks noGrp="1" noChangeAspect="1"/>
+          </p:cNvPicPr>
+          <p:nvPr>
+            <p:ph idx="1"/>
+          </p:nvPr>
+        </p:nvPicPr>
+        <p:blipFill>
+          <a:blip r:embed="rId2"/>
+          <a:stretch>
+            <a:fillRect/>
+          </a:stretch>
+        </p:blipFill>
+        <p:spPr>
+          <a:xfrm>
+            <a:off x="0" y="0"/>
+            <a:ext cx="12192000" cy="6858000"/>
+          </a:xfrm>
+        </p:spPr>
+      </p:pic>
+      <p:sp>
+        <p:nvSpPr>
+          <p:cNvPr id="3" name="CaixaDeTexto 2">
+            <a:extLst>
+              <a:ext uri="{FF2B5EF4-FFF2-40B4-BE49-F238E27FC236}">
+                <a16:creationId xmlns:a16="http://schemas.microsoft.com/office/drawing/2014/main" id="{6D7F2C44-92E1-685C-6CF1-B2EB4E250AD8}"/>
+              </a:ext>
+            </a:extLst>
+          </p:cNvPr>
+          <p:cNvSpPr txBox="1"/>
+          <p:nvPr/>
+        </p:nvSpPr>
+        <p:spPr>
+          <a:xfrm>
+            <a:off x="1524001" y="4825523"/>
+            <a:ext cx="9886121" cy="1015663"/>
+          </a:xfrm>
+          <a:prstGeom prst="rect">
+            <a:avLst/>
+          </a:prstGeom>
+          <a:noFill/>
+        </p:spPr>
+        <p:txBody>
+          <a:bodyPr wrap="square" rtlCol="0">
+            <a:spAutoFit/>
+          </a:bodyPr>
+          <a:lstStyle/>
+          <a:p>
+            <a:pPr algn="just"/>
+            <a:r>
+              <a:rPr lang="pt-BR" sz="6000" b="1" dirty="0">
                 <a:solidFill>
                   <a:srgbClr val="F8F8F2"/>
                 </a:solidFill>
                 <a:effectLst/>
-                <a:latin typeface="Consolas" panose="020B0609020204030204" pitchFamily="49" charset="0"/>
               </a:rPr>
-              <a:t>No entanto, da escuridão que era a Grã-Bretanha dos anos 80, surge uma luz na forma de 2-Tone. Originário de West Midlands da Inglaterra, surgem três grandes bandas de 2 tons: The </a:t>
+              <a:t>A criação do 2-Tone </a:t>
             </a:r>
             <a:r>
-              <a:rPr lang="pt-BR" b="0" dirty="0" err="1">
+              <a:rPr lang="pt-BR" sz="6000" b="1" dirty="0" err="1">
                 <a:solidFill>
                   <a:srgbClr val="F8F8F2"/>
                 </a:solidFill>
                 <a:effectLst/>
-                <a:latin typeface="Consolas" panose="020B0609020204030204" pitchFamily="49" charset="0"/>
-              </a:rPr>
-              <a:t>Specials</a:t>
-            </a:r>
-            <a:r>
-              <a:rPr lang="pt-BR" b="0" dirty="0">
-                <a:solidFill>
-                  <a:srgbClr val="F8F8F2"/>
-                </a:solidFill>
-                <a:effectLst/>
-                <a:latin typeface="Consolas" panose="020B0609020204030204" pitchFamily="49" charset="0"/>
-              </a:rPr>
-              <a:t>, The </a:t>
-            </a:r>
-            <a:r>
-              <a:rPr lang="pt-BR" b="0" dirty="0" err="1">
-                <a:solidFill>
-                  <a:srgbClr val="F8F8F2"/>
-                </a:solidFill>
-                <a:effectLst/>
-                <a:latin typeface="Consolas" panose="020B0609020204030204" pitchFamily="49" charset="0"/>
-              </a:rPr>
-              <a:t>Selecter</a:t>
-            </a:r>
-            <a:r>
-              <a:rPr lang="pt-BR" b="0" dirty="0">
-                <a:solidFill>
-                  <a:srgbClr val="F8F8F2"/>
-                </a:solidFill>
-                <a:effectLst/>
-                <a:latin typeface="Consolas" panose="020B0609020204030204" pitchFamily="49" charset="0"/>
-              </a:rPr>
-              <a:t> e The Beat, todas com membros do Caribe que migram para a Inglaterra e membros originários da Inglaterra. Desta fusão do Punk com o </a:t>
-            </a:r>
-            <a:r>
-              <a:rPr lang="pt-BR" b="0" dirty="0" err="1">
-                <a:solidFill>
-                  <a:srgbClr val="F8F8F2"/>
-                </a:solidFill>
-                <a:effectLst/>
-                <a:latin typeface="Consolas" panose="020B0609020204030204" pitchFamily="49" charset="0"/>
               </a:rPr>
               <a:t>Ska</a:t>
             </a:r>
-            <a:r>
-              <a:rPr lang="pt-BR" b="0" dirty="0">
-                <a:solidFill>
-                  <a:srgbClr val="F8F8F2"/>
-                </a:solidFill>
-                <a:effectLst/>
-                <a:latin typeface="Consolas" panose="020B0609020204030204" pitchFamily="49" charset="0"/>
-              </a:rPr>
-              <a:t> Jamaicano criava-se o 2-Tone. O estilo foi nomeado após os ternos tônicos de dois tons usados por “</a:t>
-            </a:r>
-            <a:r>
-              <a:rPr lang="pt-BR" b="0" dirty="0" err="1">
-                <a:solidFill>
-                  <a:srgbClr val="F8F8F2"/>
-                </a:solidFill>
-                <a:effectLst/>
-                <a:latin typeface="Consolas" panose="020B0609020204030204" pitchFamily="49" charset="0"/>
-              </a:rPr>
-              <a:t>mods</a:t>
-            </a:r>
-            <a:r>
-              <a:rPr lang="pt-BR" b="0" dirty="0">
-                <a:solidFill>
-                  <a:srgbClr val="F8F8F2"/>
-                </a:solidFill>
-                <a:effectLst/>
-                <a:latin typeface="Consolas" panose="020B0609020204030204" pitchFamily="49" charset="0"/>
-              </a:rPr>
-              <a:t>” e “skinheads” no final dos anos 1960, e o nome também capturou a natureza multirracial das bandas.</a:t>
-            </a:r>
+            <a:endParaRPr lang="pt-BR" sz="6000" b="1" dirty="0">
+              <a:solidFill>
+                <a:srgbClr val="F8F8F2"/>
+              </a:solidFill>
+              <a:effectLst/>
+            </a:endParaRPr>
           </a:p>
         </p:txBody>
       </p:sp>
@@ -5920,6 +6006,9 @@
   <p:clrMapOvr>
     <a:masterClrMapping/>
   </p:clrMapOvr>
+  <p:transition spd="slow">
+    <p:push dir="u"/>
+  </p:transition>
   <p:timing>
     <p:tnLst>
       <p:par>
@@ -6226,7 +6315,7 @@
 </p:sld>
 </file>
 
-<file path=ppt/slides/slide5.xml><?xml version="1.0" encoding="utf-8"?>
+<file path=ppt/slides/slide6.xml><?xml version="1.0" encoding="utf-8"?>
 <p:sld xmlns:a="http://schemas.openxmlformats.org/drawingml/2006/main" xmlns:r="http://schemas.openxmlformats.org/officeDocument/2006/relationships" xmlns:p="http://schemas.openxmlformats.org/presentationml/2006/main">
   <p:cSld>
     <p:spTree>
@@ -6286,8 +6375,8 @@
         </p:nvSpPr>
         <p:spPr>
           <a:xfrm>
-            <a:off x="901149" y="504741"/>
-            <a:ext cx="10933044" cy="1754326"/>
+            <a:off x="1749288" y="358444"/>
+            <a:ext cx="10628242" cy="830997"/>
           </a:xfrm>
           <a:prstGeom prst="rect">
             <a:avLst/>
@@ -6302,38 +6391,15 @@
           <a:p>
             <a:pPr algn="just"/>
             <a:r>
-              <a:rPr lang="pt-BR" sz="1800" dirty="0">
+              <a:rPr lang="pt-BR" sz="4800" b="1" dirty="0">
                 <a:effectLst/>
-                <a:latin typeface="Calibri Light" panose="020F0302020204030204" pitchFamily="34" charset="0"/>
                 <a:ea typeface="Calibri" panose="020F0502020204030204" pitchFamily="34" charset="0"/>
                 <a:cs typeface="Calibri Light" panose="020F0302020204030204" pitchFamily="34" charset="0"/>
               </a:rPr>
-              <a:t>A ideia desse projeto é, não apenas mostrar que o 2-Tone </a:t>
+              <a:t>Por que eu escolhi esse tema?</a:t>
             </a:r>
-            <a:r>
-              <a:rPr lang="pt-BR" sz="1800" dirty="0" err="1">
-                <a:effectLst/>
-                <a:latin typeface="Calibri Light" panose="020F0302020204030204" pitchFamily="34" charset="0"/>
-                <a:ea typeface="Calibri" panose="020F0502020204030204" pitchFamily="34" charset="0"/>
-                <a:cs typeface="Calibri Light" panose="020F0302020204030204" pitchFamily="34" charset="0"/>
-              </a:rPr>
-              <a:t>Ska</a:t>
-            </a:r>
-            <a:r>
-              <a:rPr lang="pt-BR" sz="1800" dirty="0">
-                <a:effectLst/>
-                <a:latin typeface="Calibri Light" panose="020F0302020204030204" pitchFamily="34" charset="0"/>
-                <a:ea typeface="Calibri" panose="020F0502020204030204" pitchFamily="34" charset="0"/>
-                <a:cs typeface="Calibri Light" panose="020F0302020204030204" pitchFamily="34" charset="0"/>
-              </a:rPr>
-              <a:t> é um estilo de música como qualquer outro, mas sim, trazer a sua rica história de luta contra o racismo e a desigualdade social que assombrava, e talvez, assombre até hoje, a Inglaterra e, também o resto do mundo. Além disso, é se fazer necessário entender que não podemos deixar a História para trás, pois é ela que nos forma e nos faz o que somos hoje. Abandonar o passado é cometer o erro de se repetir coisas terríveis novamente.</a:t>
-            </a:r>
-          </a:p>
-          <a:p>
-            <a:pPr algn="just"/>
-            <a:endParaRPr lang="pt-BR" b="0" dirty="0">
+            <a:endParaRPr lang="pt-BR" sz="4800" b="1" dirty="0">
               <a:effectLst/>
-              <a:latin typeface="Consolas" panose="020B0609020204030204" pitchFamily="49" charset="0"/>
             </a:endParaRPr>
           </a:p>
         </p:txBody>
@@ -6438,6 +6504,9 @@
   <p:clrMapOvr>
     <a:masterClrMapping/>
   </p:clrMapOvr>
+  <p:transition spd="slow">
+    <p:push dir="u"/>
+  </p:transition>
   <p:timing>
     <p:tnLst>
       <p:par>
@@ -6673,6 +6742,339 @@
       </p:par>
     </p:tnLst>
   </p:timing>
+</p:sld>
+</file>
+
+<file path=ppt/slides/slide7.xml><?xml version="1.0" encoding="utf-8"?>
+<p:sld xmlns:a="http://schemas.openxmlformats.org/drawingml/2006/main" xmlns:r="http://schemas.openxmlformats.org/officeDocument/2006/relationships" xmlns:p="http://schemas.openxmlformats.org/presentationml/2006/main">
+  <p:cSld>
+    <p:spTree>
+      <p:nvGrpSpPr>
+        <p:cNvPr id="1" name=""/>
+        <p:cNvGrpSpPr/>
+        <p:nvPr/>
+      </p:nvGrpSpPr>
+      <p:grpSpPr>
+        <a:xfrm>
+          <a:off x="0" y="0"/>
+          <a:ext cx="0" cy="0"/>
+          <a:chOff x="0" y="0"/>
+          <a:chExt cx="0" cy="0"/>
+        </a:xfrm>
+      </p:grpSpPr>
+      <p:pic>
+        <p:nvPicPr>
+          <p:cNvPr id="5" name="Espaço Reservado para Conteúdo 4" descr="Forma, Retângulo&#10;&#10;Descrição gerada automaticamente">
+            <a:extLst>
+              <a:ext uri="{FF2B5EF4-FFF2-40B4-BE49-F238E27FC236}">
+                <a16:creationId xmlns:a16="http://schemas.microsoft.com/office/drawing/2014/main" id="{A8AE5624-8DD3-8AE7-51AD-FE72F67AB807}"/>
+              </a:ext>
+            </a:extLst>
+          </p:cNvPr>
+          <p:cNvPicPr>
+            <a:picLocks noGrp="1" noChangeAspect="1"/>
+          </p:cNvPicPr>
+          <p:nvPr>
+            <p:ph idx="1"/>
+          </p:nvPr>
+        </p:nvPicPr>
+        <p:blipFill>
+          <a:blip r:embed="rId2"/>
+          <a:stretch>
+            <a:fillRect/>
+          </a:stretch>
+        </p:blipFill>
+        <p:spPr>
+          <a:xfrm>
+            <a:off x="0" y="-1"/>
+            <a:ext cx="12192000" cy="7885043"/>
+          </a:xfrm>
+        </p:spPr>
+      </p:pic>
+      <p:sp>
+        <p:nvSpPr>
+          <p:cNvPr id="3" name="CaixaDeTexto 2">
+            <a:extLst>
+              <a:ext uri="{FF2B5EF4-FFF2-40B4-BE49-F238E27FC236}">
+                <a16:creationId xmlns:a16="http://schemas.microsoft.com/office/drawing/2014/main" id="{6D7F2C44-92E1-685C-6CF1-B2EB4E250AD8}"/>
+              </a:ext>
+            </a:extLst>
+          </p:cNvPr>
+          <p:cNvSpPr txBox="1"/>
+          <p:nvPr/>
+        </p:nvSpPr>
+        <p:spPr>
+          <a:xfrm>
+            <a:off x="1921566" y="273486"/>
+            <a:ext cx="10628242" cy="830997"/>
+          </a:xfrm>
+          <a:prstGeom prst="rect">
+            <a:avLst/>
+          </a:prstGeom>
+          <a:noFill/>
+        </p:spPr>
+        <p:txBody>
+          <a:bodyPr wrap="square" rtlCol="0">
+            <a:spAutoFit/>
+          </a:bodyPr>
+          <a:lstStyle/>
+          <a:p>
+            <a:pPr algn="just"/>
+            <a:r>
+              <a:rPr lang="pt-BR" sz="4800" b="1" dirty="0">
+                <a:effectLst/>
+                <a:ea typeface="Calibri" panose="020F0502020204030204" pitchFamily="34" charset="0"/>
+                <a:cs typeface="Calibri Light" panose="020F0302020204030204" pitchFamily="34" charset="0"/>
+              </a:rPr>
+              <a:t>A minha maior dificuldade</a:t>
+            </a:r>
+            <a:endParaRPr lang="pt-BR" sz="4800" b="1" dirty="0">
+              <a:effectLst/>
+            </a:endParaRPr>
+          </a:p>
+        </p:txBody>
+      </p:sp>
+    </p:spTree>
+    <p:extLst>
+      <p:ext uri="{BB962C8B-B14F-4D97-AF65-F5344CB8AC3E}">
+        <p14:creationId xmlns:p14="http://schemas.microsoft.com/office/powerpoint/2010/main" val="3400891561"/>
+      </p:ext>
+    </p:extLst>
+  </p:cSld>
+  <p:clrMapOvr>
+    <a:masterClrMapping/>
+  </p:clrMapOvr>
+  <p:transition spd="slow">
+    <p:wipe/>
+  </p:transition>
+</p:sld>
+</file>
+
+<file path=ppt/slides/slide8.xml><?xml version="1.0" encoding="utf-8"?>
+<p:sld xmlns:a="http://schemas.openxmlformats.org/drawingml/2006/main" xmlns:r="http://schemas.openxmlformats.org/officeDocument/2006/relationships" xmlns:p="http://schemas.openxmlformats.org/presentationml/2006/main">
+  <p:cSld>
+    <p:spTree>
+      <p:nvGrpSpPr>
+        <p:cNvPr id="1" name=""/>
+        <p:cNvGrpSpPr/>
+        <p:nvPr/>
+      </p:nvGrpSpPr>
+      <p:grpSpPr>
+        <a:xfrm>
+          <a:off x="0" y="0"/>
+          <a:ext cx="0" cy="0"/>
+          <a:chOff x="0" y="0"/>
+          <a:chExt cx="0" cy="0"/>
+        </a:xfrm>
+      </p:grpSpPr>
+      <p:pic>
+        <p:nvPicPr>
+          <p:cNvPr id="5" name="Espaço Reservado para Conteúdo 4" descr="Forma, Retângulo&#10;&#10;Descrição gerada automaticamente">
+            <a:extLst>
+              <a:ext uri="{FF2B5EF4-FFF2-40B4-BE49-F238E27FC236}">
+                <a16:creationId xmlns:a16="http://schemas.microsoft.com/office/drawing/2014/main" id="{A8AE5624-8DD3-8AE7-51AD-FE72F67AB807}"/>
+              </a:ext>
+            </a:extLst>
+          </p:cNvPr>
+          <p:cNvPicPr>
+            <a:picLocks noGrp="1" noChangeAspect="1"/>
+          </p:cNvPicPr>
+          <p:nvPr>
+            <p:ph idx="1"/>
+          </p:nvPr>
+        </p:nvPicPr>
+        <p:blipFill>
+          <a:blip r:embed="rId2"/>
+          <a:stretch>
+            <a:fillRect/>
+          </a:stretch>
+        </p:blipFill>
+        <p:spPr>
+          <a:xfrm>
+            <a:off x="0" y="-1"/>
+            <a:ext cx="12192000" cy="7885043"/>
+          </a:xfrm>
+        </p:spPr>
+      </p:pic>
+      <p:sp>
+        <p:nvSpPr>
+          <p:cNvPr id="3" name="CaixaDeTexto 2">
+            <a:extLst>
+              <a:ext uri="{FF2B5EF4-FFF2-40B4-BE49-F238E27FC236}">
+                <a16:creationId xmlns:a16="http://schemas.microsoft.com/office/drawing/2014/main" id="{6D7F2C44-92E1-685C-6CF1-B2EB4E250AD8}"/>
+              </a:ext>
+            </a:extLst>
+          </p:cNvPr>
+          <p:cNvSpPr txBox="1"/>
+          <p:nvPr/>
+        </p:nvSpPr>
+        <p:spPr>
+          <a:xfrm>
+            <a:off x="2902227" y="299991"/>
+            <a:ext cx="10628242" cy="830997"/>
+          </a:xfrm>
+          <a:prstGeom prst="rect">
+            <a:avLst/>
+          </a:prstGeom>
+          <a:noFill/>
+        </p:spPr>
+        <p:txBody>
+          <a:bodyPr wrap="square" rtlCol="0">
+            <a:spAutoFit/>
+          </a:bodyPr>
+          <a:lstStyle/>
+          <a:p>
+            <a:pPr algn="just"/>
+            <a:r>
+              <a:rPr lang="pt-BR" sz="4800" b="1" dirty="0">
+                <a:effectLst/>
+                <a:ea typeface="Calibri" panose="020F0502020204030204" pitchFamily="34" charset="0"/>
+                <a:cs typeface="Calibri Light" panose="020F0302020204030204" pitchFamily="34" charset="0"/>
+              </a:rPr>
+              <a:t>A maior superação</a:t>
+            </a:r>
+            <a:endParaRPr lang="pt-BR" sz="4800" b="1" dirty="0">
+              <a:effectLst/>
+            </a:endParaRPr>
+          </a:p>
+        </p:txBody>
+      </p:sp>
+    </p:spTree>
+    <p:extLst>
+      <p:ext uri="{BB962C8B-B14F-4D97-AF65-F5344CB8AC3E}">
+        <p14:creationId xmlns:p14="http://schemas.microsoft.com/office/powerpoint/2010/main" val="717050879"/>
+      </p:ext>
+    </p:extLst>
+  </p:cSld>
+  <p:clrMapOvr>
+    <a:masterClrMapping/>
+  </p:clrMapOvr>
+  <mc:AlternateContent xmlns:mc="http://schemas.openxmlformats.org/markup-compatibility/2006">
+    <mc:Choice xmlns:p159="http://schemas.microsoft.com/office/powerpoint/2015/09/main" Requires="p159">
+      <p:transition xmlns:p14="http://schemas.microsoft.com/office/powerpoint/2010/main" spd="slow" p14:dur="2000">
+        <p159:morph option="byObject"/>
+      </p:transition>
+    </mc:Choice>
+    <mc:Fallback>
+      <p:transition spd="slow">
+        <p:fade/>
+      </p:transition>
+    </mc:Fallback>
+  </mc:AlternateContent>
+</p:sld>
+</file>
+
+<file path=ppt/slides/slide9.xml><?xml version="1.0" encoding="utf-8"?>
+<p:sld xmlns:a="http://schemas.openxmlformats.org/drawingml/2006/main" xmlns:r="http://schemas.openxmlformats.org/officeDocument/2006/relationships" xmlns:p="http://schemas.openxmlformats.org/presentationml/2006/main">
+  <p:cSld>
+    <p:spTree>
+      <p:nvGrpSpPr>
+        <p:cNvPr id="1" name=""/>
+        <p:cNvGrpSpPr/>
+        <p:nvPr/>
+      </p:nvGrpSpPr>
+      <p:grpSpPr>
+        <a:xfrm>
+          <a:off x="0" y="0"/>
+          <a:ext cx="0" cy="0"/>
+          <a:chOff x="0" y="0"/>
+          <a:chExt cx="0" cy="0"/>
+        </a:xfrm>
+      </p:grpSpPr>
+      <p:pic>
+        <p:nvPicPr>
+          <p:cNvPr id="5" name="Espaço Reservado para Conteúdo 4" descr="Forma, Retângulo&#10;&#10;Descrição gerada automaticamente">
+            <a:extLst>
+              <a:ext uri="{FF2B5EF4-FFF2-40B4-BE49-F238E27FC236}">
+                <a16:creationId xmlns:a16="http://schemas.microsoft.com/office/drawing/2014/main" id="{A8AE5624-8DD3-8AE7-51AD-FE72F67AB807}"/>
+              </a:ext>
+            </a:extLst>
+          </p:cNvPr>
+          <p:cNvPicPr>
+            <a:picLocks noGrp="1" noChangeAspect="1"/>
+          </p:cNvPicPr>
+          <p:nvPr>
+            <p:ph idx="1"/>
+          </p:nvPr>
+        </p:nvPicPr>
+        <p:blipFill>
+          <a:blip r:embed="rId2"/>
+          <a:stretch>
+            <a:fillRect/>
+          </a:stretch>
+        </p:blipFill>
+        <p:spPr>
+          <a:xfrm>
+            <a:off x="0" y="-1"/>
+            <a:ext cx="12192000" cy="7885043"/>
+          </a:xfrm>
+        </p:spPr>
+      </p:pic>
+      <p:sp>
+        <p:nvSpPr>
+          <p:cNvPr id="3" name="CaixaDeTexto 2">
+            <a:extLst>
+              <a:ext uri="{FF2B5EF4-FFF2-40B4-BE49-F238E27FC236}">
+                <a16:creationId xmlns:a16="http://schemas.microsoft.com/office/drawing/2014/main" id="{6D7F2C44-92E1-685C-6CF1-B2EB4E250AD8}"/>
+              </a:ext>
+            </a:extLst>
+          </p:cNvPr>
+          <p:cNvSpPr txBox="1"/>
+          <p:nvPr/>
+        </p:nvSpPr>
+        <p:spPr>
+          <a:xfrm>
+            <a:off x="3405810" y="326495"/>
+            <a:ext cx="10628242" cy="830997"/>
+          </a:xfrm>
+          <a:prstGeom prst="rect">
+            <a:avLst/>
+          </a:prstGeom>
+          <a:noFill/>
+        </p:spPr>
+        <p:txBody>
+          <a:bodyPr wrap="square" rtlCol="0">
+            <a:spAutoFit/>
+          </a:bodyPr>
+          <a:lstStyle/>
+          <a:p>
+            <a:pPr algn="just"/>
+            <a:r>
+              <a:rPr lang="pt-BR" sz="4800" b="1" dirty="0">
+                <a:effectLst/>
+                <a:ea typeface="Calibri" panose="020F0502020204030204" pitchFamily="34" charset="0"/>
+                <a:cs typeface="Calibri Light" panose="020F0302020204030204" pitchFamily="34" charset="0"/>
+              </a:rPr>
+              <a:t>Agradecimentos</a:t>
+            </a:r>
+            <a:endParaRPr lang="pt-BR" sz="4800" b="1" dirty="0">
+              <a:effectLst/>
+            </a:endParaRPr>
+          </a:p>
+        </p:txBody>
+      </p:sp>
+    </p:spTree>
+    <p:extLst>
+      <p:ext uri="{BB962C8B-B14F-4D97-AF65-F5344CB8AC3E}">
+        <p14:creationId xmlns:p14="http://schemas.microsoft.com/office/powerpoint/2010/main" val="4213219144"/>
+      </p:ext>
+    </p:extLst>
+  </p:cSld>
+  <p:clrMapOvr>
+    <a:masterClrMapping/>
+  </p:clrMapOvr>
+  <mc:AlternateContent xmlns:mc="http://schemas.openxmlformats.org/markup-compatibility/2006">
+    <mc:Choice xmlns:p14="http://schemas.microsoft.com/office/powerpoint/2010/main" Requires="p14">
+      <p:transition p14:dur="100">
+        <p:cut/>
+      </p:transition>
+    </mc:Choice>
+    <mc:Fallback>
+      <p:transition>
+        <p:cut/>
+      </p:transition>
+    </mc:Fallback>
+  </mc:AlternateContent>
 </p:sld>
 </file>
 

</xml_diff>